<commit_message>
Apply Blue Drop template style to FY26 Q2 Board Presentation
Updated all slides to match the Blue Drop FY25 Q2-Q3 template style:
- Primary color changed from #1C2833 to #1C4587 (Blue Drop navy)
- Accent blue updated to #058DC7
- Green indicators updated to #50B432
- Alert/warning color updated to #ED561B
- Backgrounds changed to white (#FFFFFF) for cleaner look
- Chart colors aligned with Blue Drop brand palette

Co-Authored-By: Claude Opus 4.5 <noreply@anthropic.com>
</commit_message>
<xml_diff>
--- a/Documents/SDO - Workspace/FY26_Q2_Board_Presentation.pptx
+++ b/Documents/SDO - Workspace/FY26_Q2_Board_Presentation.pptx
@@ -141,7 +141,7 @@
           </c:tx>
           <c:spPr>
             <a:solidFill>
-              <a:srgbClr val="1C2833"/>
+              <a:srgbClr val="1C4587"/>
             </a:solidFill>
             <a:effectLst/>
           </c:spPr>
@@ -236,7 +236,7 @@
           </c:tx>
           <c:spPr>
             <a:solidFill>
-              <a:srgbClr val="27AE60"/>
+              <a:srgbClr val="50B432"/>
             </a:solidFill>
             <a:effectLst/>
           </c:spPr>
@@ -525,7 +525,7 @@
           </c:tx>
           <c:spPr>
             <a:solidFill>
-              <a:srgbClr val="0077B6"/>
+              <a:srgbClr val="058DC7"/>
             </a:solidFill>
             <a:effectLst/>
           </c:spPr>
@@ -614,7 +614,7 @@
           </c:tx>
           <c:spPr>
             <a:solidFill>
-              <a:srgbClr val="27AE60"/>
+              <a:srgbClr val="50B432"/>
             </a:solidFill>
             <a:effectLst/>
           </c:spPr>
@@ -2119,7 +2119,7 @@
     <p:bg>
       <p:bgPr>
         <a:solidFill>
-          <a:srgbClr val="0077B6"/>
+          <a:srgbClr val="FFFFFF"/>
         </a:solidFill>
       </p:bgPr>
     </p:bg>
@@ -2145,25 +2145,37 @@
         </p:nvSpPr>
         <p:spPr>
           <a:xfrm>
-            <a:off x="0" y="0"/>
-            <a:ext cx="9144000" cy="101501"/>
-          </a:xfrm>
-          <a:prstGeom prst="rect">
-            <a:avLst/>
-          </a:prstGeom>
-          <a:solidFill>
-            <a:srgbClr val="00B4D8"/>
-          </a:solidFill>
-          <a:ln/>
-        </p:spPr>
-        <p:txBody>
-          <a:bodyPr wrap="square" rtlCol="0" anchor="ctr"/>
-          <a:lstStyle/>
-          <a:p>
-            <a:pPr indent="0" marL="0">
-              <a:buNone/>
-            </a:pPr>
-            <a:endParaRPr lang="en-US" dirty="0"/>
+            <a:off x="381000" y="1452711"/>
+            <a:ext cx="8549640" cy="581025"/>
+          </a:xfrm>
+          <a:prstGeom prst="rect">
+            <a:avLst/>
+          </a:prstGeom>
+          <a:noFill/>
+          <a:ln/>
+        </p:spPr>
+        <p:txBody>
+          <a:bodyPr wrap="square" lIns="0" tIns="0" rIns="0" bIns="0" rtlCol="0" anchor="t"/>
+          <a:lstStyle/>
+          <a:p>
+            <a:pPr algn="l" indent="0" marL="0">
+              <a:spcAft>
+                <a:spcPts val="800"/>
+              </a:spcAft>
+              <a:buNone/>
+            </a:pPr>
+            <a:r>
+              <a:rPr lang="en-US" sz="4000" b="1" dirty="0">
+                <a:solidFill>
+                  <a:srgbClr val="1C4587"/>
+                </a:solidFill>
+                <a:latin typeface="Arial" pitchFamily="34" charset="0"/>
+                <a:ea typeface="Arial" pitchFamily="34" charset="-122"/>
+                <a:cs typeface="Arial" pitchFamily="34" charset="-120"/>
+              </a:rPr>
+              <a:t>Blue Drop Board</a:t>
+            </a:r>
+            <a:endParaRPr lang="en-US" sz="4000" dirty="0"/>
           </a:p>
         </p:txBody>
       </p:sp>
@@ -2175,79 +2187,79 @@
         </p:nvSpPr>
         <p:spPr>
           <a:xfrm>
-            <a:off x="2498198" y="1401812"/>
-            <a:ext cx="4147456" cy="638175"/>
-          </a:xfrm>
-          <a:prstGeom prst="rect">
-            <a:avLst/>
-          </a:prstGeom>
-          <a:noFill/>
-          <a:ln/>
-        </p:spPr>
-        <p:txBody>
-          <a:bodyPr wrap="square" lIns="0" tIns="0" rIns="0" bIns="0" rtlCol="0" anchor="t"/>
-          <a:lstStyle/>
-          <a:p>
-            <a:pPr algn="ctr" indent="0" marL="0">
+            <a:off x="381000" y="2135237"/>
+            <a:ext cx="8549640" cy="581025"/>
+          </a:xfrm>
+          <a:prstGeom prst="rect">
+            <a:avLst/>
+          </a:prstGeom>
+          <a:noFill/>
+          <a:ln/>
+        </p:spPr>
+        <p:txBody>
+          <a:bodyPr wrap="square" lIns="0" tIns="0" rIns="0" bIns="0" rtlCol="0" anchor="t"/>
+          <a:lstStyle/>
+          <a:p>
+            <a:pPr algn="l" indent="0" marL="0">
+              <a:spcAft>
+                <a:spcPts val="800"/>
+              </a:spcAft>
+              <a:buNone/>
+            </a:pPr>
+            <a:r>
+              <a:rPr lang="en-US" sz="4000" b="1" dirty="0">
+                <a:solidFill>
+                  <a:srgbClr val="1C4587"/>
+                </a:solidFill>
+                <a:latin typeface="Arial" pitchFamily="34" charset="0"/>
+                <a:ea typeface="Arial" pitchFamily="34" charset="-122"/>
+                <a:cs typeface="Arial" pitchFamily="34" charset="-120"/>
+              </a:rPr>
+              <a:t>Update</a:t>
+            </a:r>
+            <a:endParaRPr lang="en-US" sz="4000" dirty="0"/>
+          </a:p>
+        </p:txBody>
+      </p:sp>
+      <p:sp>
+        <p:nvSpPr>
+          <p:cNvPr id="4" name="Text 2"/>
+          <p:cNvSpPr/>
+          <p:nvPr/>
+        </p:nvSpPr>
+        <p:spPr>
+          <a:xfrm>
+            <a:off x="381000" y="2817763"/>
+            <a:ext cx="8549640" cy="352425"/>
+          </a:xfrm>
+          <a:prstGeom prst="rect">
+            <a:avLst/>
+          </a:prstGeom>
+          <a:noFill/>
+          <a:ln/>
+        </p:spPr>
+        <p:txBody>
+          <a:bodyPr wrap="square" lIns="0" tIns="0" rIns="0" bIns="0" rtlCol="0" anchor="t"/>
+          <a:lstStyle/>
+          <a:p>
+            <a:pPr algn="l" indent="0" marL="0">
               <a:spcAft>
                 <a:spcPts val="2000"/>
               </a:spcAft>
               <a:buNone/>
             </a:pPr>
             <a:r>
-              <a:rPr lang="en-US" sz="4400" b="1" dirty="0">
-                <a:solidFill>
-                  <a:srgbClr val="FFFFFF"/>
-                </a:solidFill>
-                <a:latin typeface="Arial" pitchFamily="34" charset="0"/>
-                <a:ea typeface="Arial" pitchFamily="34" charset="-122"/>
-                <a:cs typeface="Arial" pitchFamily="34" charset="-120"/>
-              </a:rPr>
-              <a:t>Blue Drop, LLC</a:t>
-            </a:r>
-            <a:endParaRPr lang="en-US" sz="4400" dirty="0"/>
-          </a:p>
-        </p:txBody>
-      </p:sp>
-      <p:sp>
-        <p:nvSpPr>
-          <p:cNvPr id="4" name="Text 2"/>
-          <p:cNvSpPr/>
-          <p:nvPr/>
-        </p:nvSpPr>
-        <p:spPr>
-          <a:xfrm>
-            <a:off x="1900694" y="2293888"/>
-            <a:ext cx="5342462" cy="409575"/>
-          </a:xfrm>
-          <a:prstGeom prst="rect">
-            <a:avLst/>
-          </a:prstGeom>
-          <a:noFill/>
-          <a:ln/>
-        </p:spPr>
-        <p:txBody>
-          <a:bodyPr wrap="square" lIns="0" tIns="0" rIns="0" bIns="0" rtlCol="0" anchor="t"/>
-          <a:lstStyle/>
-          <a:p>
-            <a:pPr algn="ctr" indent="0" marL="0">
-              <a:spcAft>
-                <a:spcPts val="3000"/>
-              </a:spcAft>
-              <a:buNone/>
-            </a:pPr>
-            <a:r>
-              <a:rPr lang="en-US" sz="2800" dirty="0">
-                <a:solidFill>
-                  <a:srgbClr val="CAF0F8"/>
-                </a:solidFill>
-                <a:latin typeface="Arial" pitchFamily="34" charset="0"/>
-                <a:ea typeface="Arial" pitchFamily="34" charset="-122"/>
-                <a:cs typeface="Arial" pitchFamily="34" charset="-120"/>
-              </a:rPr>
-              <a:t>FY26 Q2 Board Financial Update</a:t>
-            </a:r>
-            <a:endParaRPr lang="en-US" sz="2800" dirty="0"/>
+              <a:rPr lang="en-US" sz="2400" dirty="0">
+                <a:solidFill>
+                  <a:srgbClr val="1C4587"/>
+                </a:solidFill>
+                <a:latin typeface="Arial" pitchFamily="34" charset="0"/>
+                <a:ea typeface="Arial" pitchFamily="34" charset="-122"/>
+                <a:cs typeface="Arial" pitchFamily="34" charset="-120"/>
+              </a:rPr>
+              <a:t>FY26 - Q2 Financial Review</a:t>
+            </a:r>
+            <a:endParaRPr lang="en-US" sz="2400" dirty="0"/>
           </a:p>
         </p:txBody>
       </p:sp>
@@ -2259,76 +2271,34 @@
         </p:nvSpPr>
         <p:spPr>
           <a:xfrm>
-            <a:off x="3865351" y="3084463"/>
-            <a:ext cx="1413150" cy="266700"/>
-          </a:xfrm>
-          <a:prstGeom prst="rect">
-            <a:avLst/>
-          </a:prstGeom>
-          <a:noFill/>
-          <a:ln/>
-        </p:spPr>
-        <p:txBody>
-          <a:bodyPr wrap="square" lIns="0" tIns="0" rIns="0" bIns="0" rtlCol="0" anchor="t"/>
-          <a:lstStyle/>
-          <a:p>
-            <a:pPr algn="ctr" indent="0" marL="0">
+            <a:off x="381000" y="3424089"/>
+            <a:ext cx="8549640" cy="266700"/>
+          </a:xfrm>
+          <a:prstGeom prst="rect">
+            <a:avLst/>
+          </a:prstGeom>
+          <a:noFill/>
+          <a:ln/>
+        </p:spPr>
+        <p:txBody>
+          <a:bodyPr wrap="square" lIns="0" tIns="0" rIns="0" bIns="0" rtlCol="0" anchor="t"/>
+          <a:lstStyle/>
+          <a:p>
+            <a:pPr algn="l" indent="0" marL="0">
               <a:buNone/>
             </a:pPr>
             <a:r>
               <a:rPr lang="en-US" sz="1800" dirty="0">
                 <a:solidFill>
-                  <a:srgbClr val="FFFFFF"/>
-                </a:solidFill>
-                <a:latin typeface="Arial" pitchFamily="34" charset="0"/>
-                <a:ea typeface="Arial" pitchFamily="34" charset="-122"/>
-                <a:cs typeface="Arial" pitchFamily="34" charset="-120"/>
-              </a:rPr>
-              <a:t>January 2026</a:t>
+                  <a:srgbClr val="1C4587"/>
+                </a:solidFill>
+                <a:latin typeface="Arial" pitchFamily="34" charset="0"/>
+                <a:ea typeface="Arial" pitchFamily="34" charset="-122"/>
+                <a:cs typeface="Arial" pitchFamily="34" charset="-120"/>
+              </a:rPr>
+              <a:t>YTD Performance: October 1, 2025 - January 19, 2026</a:t>
             </a:r>
             <a:endParaRPr lang="en-US" sz="1800" dirty="0"/>
-          </a:p>
-        </p:txBody>
-      </p:sp>
-      <p:sp>
-        <p:nvSpPr>
-          <p:cNvPr id="6" name="Text 4"/>
-          <p:cNvSpPr/>
-          <p:nvPr/>
-        </p:nvSpPr>
-        <p:spPr>
-          <a:xfrm>
-            <a:off x="2292956" y="3605064"/>
-            <a:ext cx="4558088" cy="238125"/>
-          </a:xfrm>
-          <a:prstGeom prst="rect">
-            <a:avLst/>
-          </a:prstGeom>
-          <a:noFill/>
-          <a:ln/>
-        </p:spPr>
-        <p:txBody>
-          <a:bodyPr wrap="square" lIns="0" tIns="0" rIns="0" bIns="0" rtlCol="0" anchor="t"/>
-          <a:lstStyle/>
-          <a:p>
-            <a:pPr algn="ctr" indent="0" marL="0">
-              <a:spcBef>
-                <a:spcPts val="2000"/>
-              </a:spcBef>
-              <a:buNone/>
-            </a:pPr>
-            <a:r>
-              <a:rPr lang="en-US" sz="1600" dirty="0">
-                <a:solidFill>
-                  <a:srgbClr val="90E0EF"/>
-                </a:solidFill>
-                <a:latin typeface="Arial" pitchFamily="34" charset="0"/>
-                <a:ea typeface="Arial" pitchFamily="34" charset="-122"/>
-                <a:cs typeface="Arial" pitchFamily="34" charset="-120"/>
-              </a:rPr>
-              <a:t>Financial Performance Through January 19, 2026</a:t>
-            </a:r>
-            <a:endParaRPr lang="en-US" sz="1600" dirty="0"/>
           </a:p>
         </p:txBody>
       </p:sp>
@@ -2346,7 +2316,7 @@
     <p:bg>
       <p:bgPr>
         <a:solidFill>
-          <a:srgbClr val="F4F6F6"/>
+          <a:srgbClr val="FFFFFF"/>
         </a:solidFill>
       </p:bgPr>
     </p:bg>
@@ -2379,7 +2349,7 @@
             <a:avLst/>
           </a:prstGeom>
           <a:solidFill>
-            <a:srgbClr val="1C2833"/>
+            <a:srgbClr val="1C4587"/>
           </a:solidFill>
           <a:ln/>
         </p:spPr>
@@ -2446,20 +2416,13 @@
           </a:xfrm>
           <a:prstGeom prst="roundRect">
             <a:avLst>
-              <a:gd name="adj" fmla="val 7922"/>
+              <a:gd name="adj" fmla="val 5281"/>
             </a:avLst>
           </a:prstGeom>
           <a:solidFill>
-            <a:srgbClr val="FFFFFF"/>
+            <a:srgbClr val="F8F9FA"/>
           </a:solidFill>
           <a:ln/>
-          <a:effectLst>
-            <a:outerShdw sx="100000" sy="100000" kx="0" ky="0" algn="bl" rotWithShape="0" blurRad="57150" dist="13470" dir="2700000">
-              <a:srgbClr val="000000">
-                <a:alpha val="10000"/>
-              </a:srgbClr>
-            </a:outerShdw>
-          </a:effectLst>
         </p:spPr>
         <p:txBody>
           <a:bodyPr wrap="square" rtlCol="0" anchor="ctr"/>
@@ -2489,7 +2452,7 @@
           <a:noFill/>
           <a:ln w="47625">
             <a:solidFill>
-              <a:srgbClr val="27AE60"/>
+              <a:srgbClr val="50B432"/>
             </a:solidFill>
             <a:prstDash val="solid"/>
           </a:ln>
@@ -2525,7 +2488,7 @@
             <a:r>
               <a:rPr lang="en-US" sz="1000" dirty="0">
                 <a:solidFill>
-                  <a:srgbClr val="7F8C8D"/>
+                  <a:srgbClr val="666666"/>
                 </a:solidFill>
                 <a:latin typeface="Arial" pitchFamily="34" charset="0"/>
                 <a:ea typeface="Arial" pitchFamily="34" charset="-122"/>
@@ -2567,7 +2530,7 @@
             <a:r>
               <a:rPr lang="en-US" sz="2000" b="1" dirty="0">
                 <a:solidFill>
-                  <a:srgbClr val="1C2833"/>
+                  <a:srgbClr val="1C4587"/>
                 </a:solidFill>
                 <a:latin typeface="Arial" pitchFamily="34" charset="0"/>
                 <a:ea typeface="Arial" pitchFamily="34" charset="-122"/>
@@ -2606,7 +2569,7 @@
             <a:r>
               <a:rPr lang="en-US" sz="1000" dirty="0">
                 <a:solidFill>
-                  <a:srgbClr val="27AE60"/>
+                  <a:srgbClr val="50B432"/>
                 </a:solidFill>
                 <a:latin typeface="Arial" pitchFamily="34" charset="0"/>
                 <a:ea typeface="Arial" pitchFamily="34" charset="-122"/>
@@ -2631,20 +2594,13 @@
           </a:xfrm>
           <a:prstGeom prst="roundRect">
             <a:avLst>
-              <a:gd name="adj" fmla="val 7922"/>
+              <a:gd name="adj" fmla="val 5281"/>
             </a:avLst>
           </a:prstGeom>
           <a:solidFill>
-            <a:srgbClr val="FFFFFF"/>
+            <a:srgbClr val="F8F9FA"/>
           </a:solidFill>
           <a:ln/>
-          <a:effectLst>
-            <a:outerShdw sx="100000" sy="100000" kx="0" ky="0" algn="bl" rotWithShape="0" blurRad="57150" dist="13470" dir="2700000">
-              <a:srgbClr val="000000">
-                <a:alpha val="10000"/>
-              </a:srgbClr>
-            </a:outerShdw>
-          </a:effectLst>
         </p:spPr>
         <p:txBody>
           <a:bodyPr wrap="square" rtlCol="0" anchor="ctr"/>
@@ -2674,7 +2630,7 @@
           <a:noFill/>
           <a:ln w="47625">
             <a:solidFill>
-              <a:srgbClr val="27AE60"/>
+              <a:srgbClr val="50B432"/>
             </a:solidFill>
             <a:prstDash val="solid"/>
           </a:ln>
@@ -2710,7 +2666,7 @@
             <a:r>
               <a:rPr lang="en-US" sz="1000" dirty="0">
                 <a:solidFill>
-                  <a:srgbClr val="7F8C8D"/>
+                  <a:srgbClr val="666666"/>
                 </a:solidFill>
                 <a:latin typeface="Arial" pitchFamily="34" charset="0"/>
                 <a:ea typeface="Arial" pitchFamily="34" charset="-122"/>
@@ -2752,7 +2708,7 @@
             <a:r>
               <a:rPr lang="en-US" sz="2000" b="1" dirty="0">
                 <a:solidFill>
-                  <a:srgbClr val="1C2833"/>
+                  <a:srgbClr val="1C4587"/>
                 </a:solidFill>
                 <a:latin typeface="Arial" pitchFamily="34" charset="0"/>
                 <a:ea typeface="Arial" pitchFamily="34" charset="-122"/>
@@ -2791,7 +2747,7 @@
             <a:r>
               <a:rPr lang="en-US" sz="1000" dirty="0">
                 <a:solidFill>
-                  <a:srgbClr val="27AE60"/>
+                  <a:srgbClr val="50B432"/>
                 </a:solidFill>
                 <a:latin typeface="Arial" pitchFamily="34" charset="0"/>
                 <a:ea typeface="Arial" pitchFamily="34" charset="-122"/>
@@ -2816,20 +2772,13 @@
           </a:xfrm>
           <a:prstGeom prst="roundRect">
             <a:avLst>
-              <a:gd name="adj" fmla="val 7922"/>
+              <a:gd name="adj" fmla="val 5281"/>
             </a:avLst>
           </a:prstGeom>
           <a:solidFill>
-            <a:srgbClr val="FFFFFF"/>
+            <a:srgbClr val="F8F9FA"/>
           </a:solidFill>
           <a:ln/>
-          <a:effectLst>
-            <a:outerShdw sx="100000" sy="100000" kx="0" ky="0" algn="bl" rotWithShape="0" blurRad="57150" dist="13470" dir="2700000">
-              <a:srgbClr val="000000">
-                <a:alpha val="10000"/>
-              </a:srgbClr>
-            </a:outerShdw>
-          </a:effectLst>
         </p:spPr>
         <p:txBody>
           <a:bodyPr wrap="square" rtlCol="0" anchor="ctr"/>
@@ -2859,7 +2808,7 @@
           <a:noFill/>
           <a:ln w="47625">
             <a:solidFill>
-              <a:srgbClr val="F39C12"/>
+              <a:srgbClr val="ED561B"/>
             </a:solidFill>
             <a:prstDash val="solid"/>
           </a:ln>
@@ -2895,7 +2844,7 @@
             <a:r>
               <a:rPr lang="en-US" sz="1000" dirty="0">
                 <a:solidFill>
-                  <a:srgbClr val="7F8C8D"/>
+                  <a:srgbClr val="666666"/>
                 </a:solidFill>
                 <a:latin typeface="Arial" pitchFamily="34" charset="0"/>
                 <a:ea typeface="Arial" pitchFamily="34" charset="-122"/>
@@ -2937,7 +2886,7 @@
             <a:r>
               <a:rPr lang="en-US" sz="2000" b="1" dirty="0">
                 <a:solidFill>
-                  <a:srgbClr val="1C2833"/>
+                  <a:srgbClr val="1C4587"/>
                 </a:solidFill>
                 <a:latin typeface="Arial" pitchFamily="34" charset="0"/>
                 <a:ea typeface="Arial" pitchFamily="34" charset="-122"/>
@@ -2976,7 +2925,7 @@
             <a:r>
               <a:rPr lang="en-US" sz="1000" dirty="0">
                 <a:solidFill>
-                  <a:srgbClr val="F39C12"/>
+                  <a:srgbClr val="ED561B"/>
                 </a:solidFill>
                 <a:latin typeface="Arial" pitchFamily="34" charset="0"/>
                 <a:ea typeface="Arial" pitchFamily="34" charset="-122"/>
@@ -3001,20 +2950,13 @@
           </a:xfrm>
           <a:prstGeom prst="roundRect">
             <a:avLst>
-              <a:gd name="adj" fmla="val 2524"/>
+              <a:gd name="adj" fmla="val 1682"/>
             </a:avLst>
           </a:prstGeom>
           <a:solidFill>
-            <a:srgbClr val="FFFFFF"/>
+            <a:srgbClr val="F8F9FA"/>
           </a:solidFill>
           <a:ln/>
-          <a:effectLst>
-            <a:outerShdw sx="100000" sy="100000" kx="0" ky="0" algn="bl" rotWithShape="0" blurRad="57150" dist="13470" dir="2700000">
-              <a:srgbClr val="000000">
-                <a:alpha val="10000"/>
-              </a:srgbClr>
-            </a:outerShdw>
-          </a:effectLst>
         </p:spPr>
         <p:txBody>
           <a:bodyPr wrap="square" rtlCol="0" anchor="ctr"/>
@@ -3057,7 +2999,7 @@
             <a:r>
               <a:rPr lang="en-US" sz="1200" b="1" dirty="0">
                 <a:solidFill>
-                  <a:srgbClr val="1C2833"/>
+                  <a:srgbClr val="1C4587"/>
                 </a:solidFill>
                 <a:latin typeface="Arial" pitchFamily="34" charset="0"/>
                 <a:ea typeface="Arial" pitchFamily="34" charset="-122"/>
@@ -3102,7 +3044,7 @@
             <a:r>
               <a:rPr lang="en-US" sz="1000" dirty="0">
                 <a:solidFill>
-                  <a:srgbClr val="2C3E50"/>
+                  <a:srgbClr val="333333"/>
                 </a:solidFill>
                 <a:latin typeface="Arial" pitchFamily="34" charset="0"/>
                 <a:ea typeface="Arial" pitchFamily="34" charset="-122"/>
@@ -3147,7 +3089,7 @@
             <a:r>
               <a:rPr lang="en-US" sz="1000" dirty="0">
                 <a:solidFill>
-                  <a:srgbClr val="2C3E50"/>
+                  <a:srgbClr val="333333"/>
                 </a:solidFill>
                 <a:latin typeface="Arial" pitchFamily="34" charset="0"/>
                 <a:ea typeface="Arial" pitchFamily="34" charset="-122"/>
@@ -3192,7 +3134,7 @@
             <a:r>
               <a:rPr lang="en-US" sz="1000" dirty="0">
                 <a:solidFill>
-                  <a:srgbClr val="2C3E50"/>
+                  <a:srgbClr val="333333"/>
                 </a:solidFill>
                 <a:latin typeface="Arial" pitchFamily="34" charset="0"/>
                 <a:ea typeface="Arial" pitchFamily="34" charset="-122"/>
@@ -3237,7 +3179,7 @@
             <a:r>
               <a:rPr lang="en-US" sz="1000" dirty="0">
                 <a:solidFill>
-                  <a:srgbClr val="2C3E50"/>
+                  <a:srgbClr val="333333"/>
                 </a:solidFill>
                 <a:latin typeface="Arial" pitchFamily="34" charset="0"/>
                 <a:ea typeface="Arial" pitchFamily="34" charset="-122"/>
@@ -3263,7 +3205,7 @@
     <p:bg>
       <p:bgPr>
         <a:solidFill>
-          <a:srgbClr val="F4F6F6"/>
+          <a:srgbClr val="FFFFFF"/>
         </a:solidFill>
       </p:bgPr>
     </p:bg>
@@ -3296,7 +3238,7 @@
             <a:avLst/>
           </a:prstGeom>
           <a:solidFill>
-            <a:srgbClr val="1C2833"/>
+            <a:srgbClr val="1C4587"/>
           </a:solidFill>
           <a:ln/>
         </p:spPr>
@@ -3380,7 +3322,7 @@
             <a:r>
               <a:rPr lang="en-US" sz="900" b="1" dirty="0">
                 <a:solidFill>
-                  <a:srgbClr val="1C2833"/>
+                  <a:srgbClr val="1C4587"/>
                 </a:solidFill>
                 <a:latin typeface="Arial" pitchFamily="34" charset="0"/>
                 <a:ea typeface="Arial" pitchFamily="34" charset="-122"/>
@@ -3409,7 +3351,7 @@
             </a:avLst>
           </a:prstGeom>
           <a:solidFill>
-            <a:srgbClr val="FFFFFF"/>
+            <a:srgbClr val="F8F9FA"/>
           </a:solidFill>
           <a:ln/>
         </p:spPr>
@@ -3441,7 +3383,7 @@
             </a:avLst>
           </a:prstGeom>
           <a:solidFill>
-            <a:srgbClr val="1C2833"/>
+            <a:srgbClr val="1C4587"/>
           </a:solidFill>
           <a:ln/>
         </p:spPr>
@@ -3473,7 +3415,7 @@
           <a:noFill/>
           <a:ln w="9525">
             <a:solidFill>
-              <a:srgbClr val="ECF0F1"/>
+              <a:srgbClr val="E0E0E0"/>
             </a:solidFill>
             <a:prstDash val="solid"/>
           </a:ln>
@@ -3676,7 +3618,7 @@
           <a:noFill/>
           <a:ln w="9525">
             <a:solidFill>
-              <a:srgbClr val="ECF0F1"/>
+              <a:srgbClr val="E0E0E0"/>
             </a:solidFill>
             <a:prstDash val="solid"/>
           </a:ln>
@@ -3715,7 +3657,7 @@
             <a:r>
               <a:rPr lang="en-US" sz="700" dirty="0">
                 <a:solidFill>
-                  <a:srgbClr val="2C3E50"/>
+                  <a:srgbClr val="333333"/>
                 </a:solidFill>
                 <a:latin typeface="Arial" pitchFamily="34" charset="0"/>
                 <a:ea typeface="Arial" pitchFamily="34" charset="-122"/>
@@ -3760,7 +3702,7 @@
             <a:r>
               <a:rPr lang="en-US" sz="700" b="1" dirty="0">
                 <a:solidFill>
-                  <a:srgbClr val="1C2833"/>
+                  <a:srgbClr val="1C4587"/>
                 </a:solidFill>
                 <a:latin typeface="Arial" pitchFamily="34" charset="0"/>
                 <a:ea typeface="Arial" pitchFamily="34" charset="-122"/>
@@ -3805,7 +3747,7 @@
             <a:r>
               <a:rPr lang="en-US" sz="700" b="1" dirty="0">
                 <a:solidFill>
-                  <a:srgbClr val="27AE60"/>
+                  <a:srgbClr val="50B432"/>
                 </a:solidFill>
                 <a:latin typeface="Arial" pitchFamily="34" charset="0"/>
                 <a:ea typeface="Arial" pitchFamily="34" charset="-122"/>
@@ -3850,7 +3792,7 @@
             <a:r>
               <a:rPr lang="en-US" sz="700" b="1" dirty="0">
                 <a:solidFill>
-                  <a:srgbClr val="27AE60"/>
+                  <a:srgbClr val="50B432"/>
                 </a:solidFill>
                 <a:latin typeface="Arial" pitchFamily="34" charset="0"/>
                 <a:ea typeface="Arial" pitchFamily="34" charset="-122"/>
@@ -3879,7 +3821,7 @@
           <a:noFill/>
           <a:ln w="9525">
             <a:solidFill>
-              <a:srgbClr val="ECF0F1"/>
+              <a:srgbClr val="E0E0E0"/>
             </a:solidFill>
             <a:prstDash val="solid"/>
           </a:ln>
@@ -3918,7 +3860,7 @@
             <a:r>
               <a:rPr lang="en-US" sz="700" dirty="0">
                 <a:solidFill>
-                  <a:srgbClr val="2C3E50"/>
+                  <a:srgbClr val="333333"/>
                 </a:solidFill>
                 <a:latin typeface="Arial" pitchFamily="34" charset="0"/>
                 <a:ea typeface="Arial" pitchFamily="34" charset="-122"/>
@@ -3963,7 +3905,7 @@
             <a:r>
               <a:rPr lang="en-US" sz="700" b="1" dirty="0">
                 <a:solidFill>
-                  <a:srgbClr val="1C2833"/>
+                  <a:srgbClr val="1C4587"/>
                 </a:solidFill>
                 <a:latin typeface="Arial" pitchFamily="34" charset="0"/>
                 <a:ea typeface="Arial" pitchFamily="34" charset="-122"/>
@@ -4008,7 +3950,7 @@
             <a:r>
               <a:rPr lang="en-US" sz="700" b="1" dirty="0">
                 <a:solidFill>
-                  <a:srgbClr val="C0392B"/>
+                  <a:srgbClr val="ED561B"/>
                 </a:solidFill>
                 <a:latin typeface="Arial" pitchFamily="34" charset="0"/>
                 <a:ea typeface="Arial" pitchFamily="34" charset="-122"/>
@@ -4053,7 +3995,7 @@
             <a:r>
               <a:rPr lang="en-US" sz="700" b="1" dirty="0">
                 <a:solidFill>
-                  <a:srgbClr val="C0392B"/>
+                  <a:srgbClr val="ED561B"/>
                 </a:solidFill>
                 <a:latin typeface="Arial" pitchFamily="34" charset="0"/>
                 <a:ea typeface="Arial" pitchFamily="34" charset="-122"/>
@@ -4082,7 +4024,7 @@
           <a:noFill/>
           <a:ln w="9525">
             <a:solidFill>
-              <a:srgbClr val="ECF0F1"/>
+              <a:srgbClr val="E0E0E0"/>
             </a:solidFill>
             <a:prstDash val="solid"/>
           </a:ln>
@@ -4121,7 +4063,7 @@
             <a:r>
               <a:rPr lang="en-US" sz="700" dirty="0">
                 <a:solidFill>
-                  <a:srgbClr val="2C3E50"/>
+                  <a:srgbClr val="333333"/>
                 </a:solidFill>
                 <a:latin typeface="Arial" pitchFamily="34" charset="0"/>
                 <a:ea typeface="Arial" pitchFamily="34" charset="-122"/>
@@ -4166,7 +4108,7 @@
             <a:r>
               <a:rPr lang="en-US" sz="700" b="1" dirty="0">
                 <a:solidFill>
-                  <a:srgbClr val="1C2833"/>
+                  <a:srgbClr val="1C4587"/>
                 </a:solidFill>
                 <a:latin typeface="Arial" pitchFamily="34" charset="0"/>
                 <a:ea typeface="Arial" pitchFamily="34" charset="-122"/>
@@ -4211,7 +4153,7 @@
             <a:r>
               <a:rPr lang="en-US" sz="700" b="1" dirty="0">
                 <a:solidFill>
-                  <a:srgbClr val="C0392B"/>
+                  <a:srgbClr val="ED561B"/>
                 </a:solidFill>
                 <a:latin typeface="Arial" pitchFamily="34" charset="0"/>
                 <a:ea typeface="Arial" pitchFamily="34" charset="-122"/>
@@ -4256,7 +4198,7 @@
             <a:r>
               <a:rPr lang="en-US" sz="700" b="1" dirty="0">
                 <a:solidFill>
-                  <a:srgbClr val="C0392B"/>
+                  <a:srgbClr val="ED561B"/>
                 </a:solidFill>
                 <a:latin typeface="Arial" pitchFamily="34" charset="0"/>
                 <a:ea typeface="Arial" pitchFamily="34" charset="-122"/>
@@ -4285,7 +4227,7 @@
           <a:noFill/>
           <a:ln w="9525">
             <a:solidFill>
-              <a:srgbClr val="ECF0F1"/>
+              <a:srgbClr val="E0E0E0"/>
             </a:solidFill>
             <a:prstDash val="solid"/>
           </a:ln>
@@ -4324,7 +4266,7 @@
             <a:r>
               <a:rPr lang="en-US" sz="700" dirty="0">
                 <a:solidFill>
-                  <a:srgbClr val="2C3E50"/>
+                  <a:srgbClr val="333333"/>
                 </a:solidFill>
                 <a:latin typeface="Arial" pitchFamily="34" charset="0"/>
                 <a:ea typeface="Arial" pitchFamily="34" charset="-122"/>
@@ -4369,7 +4311,7 @@
             <a:r>
               <a:rPr lang="en-US" sz="700" b="1" dirty="0">
                 <a:solidFill>
-                  <a:srgbClr val="1C2833"/>
+                  <a:srgbClr val="1C4587"/>
                 </a:solidFill>
                 <a:latin typeface="Arial" pitchFamily="34" charset="0"/>
                 <a:ea typeface="Arial" pitchFamily="34" charset="-122"/>
@@ -4414,7 +4356,7 @@
             <a:r>
               <a:rPr lang="en-US" sz="700" b="1" dirty="0">
                 <a:solidFill>
-                  <a:srgbClr val="C0392B"/>
+                  <a:srgbClr val="ED561B"/>
                 </a:solidFill>
                 <a:latin typeface="Arial" pitchFamily="34" charset="0"/>
                 <a:ea typeface="Arial" pitchFamily="34" charset="-122"/>
@@ -4459,7 +4401,7 @@
             <a:r>
               <a:rPr lang="en-US" sz="700" b="1" dirty="0">
                 <a:solidFill>
-                  <a:srgbClr val="C0392B"/>
+                  <a:srgbClr val="ED561B"/>
                 </a:solidFill>
                 <a:latin typeface="Arial" pitchFamily="34" charset="0"/>
                 <a:ea typeface="Arial" pitchFamily="34" charset="-122"/>
@@ -4488,7 +4430,7 @@
           <a:noFill/>
           <a:ln w="9525">
             <a:solidFill>
-              <a:srgbClr val="ECF0F1"/>
+              <a:srgbClr val="E0E0E0"/>
             </a:solidFill>
             <a:prstDash val="solid"/>
           </a:ln>
@@ -4527,7 +4469,7 @@
             <a:r>
               <a:rPr lang="en-US" sz="700" dirty="0">
                 <a:solidFill>
-                  <a:srgbClr val="2C3E50"/>
+                  <a:srgbClr val="333333"/>
                 </a:solidFill>
                 <a:latin typeface="Arial" pitchFamily="34" charset="0"/>
                 <a:ea typeface="Arial" pitchFamily="34" charset="-122"/>
@@ -4572,7 +4514,7 @@
             <a:r>
               <a:rPr lang="en-US" sz="700" b="1" dirty="0">
                 <a:solidFill>
-                  <a:srgbClr val="1C2833"/>
+                  <a:srgbClr val="1C4587"/>
                 </a:solidFill>
                 <a:latin typeface="Arial" pitchFamily="34" charset="0"/>
                 <a:ea typeface="Arial" pitchFamily="34" charset="-122"/>
@@ -4617,7 +4559,7 @@
             <a:r>
               <a:rPr lang="en-US" sz="700" b="1" dirty="0">
                 <a:solidFill>
-                  <a:srgbClr val="C0392B"/>
+                  <a:srgbClr val="ED561B"/>
                 </a:solidFill>
                 <a:latin typeface="Arial" pitchFamily="34" charset="0"/>
                 <a:ea typeface="Arial" pitchFamily="34" charset="-122"/>
@@ -4662,7 +4604,7 @@
             <a:r>
               <a:rPr lang="en-US" sz="700" b="1" dirty="0">
                 <a:solidFill>
-                  <a:srgbClr val="C0392B"/>
+                  <a:srgbClr val="ED561B"/>
                 </a:solidFill>
                 <a:latin typeface="Arial" pitchFamily="34" charset="0"/>
                 <a:ea typeface="Arial" pitchFamily="34" charset="-122"/>
@@ -4691,7 +4633,7 @@
           <a:noFill/>
           <a:ln w="9525">
             <a:solidFill>
-              <a:srgbClr val="ECF0F1"/>
+              <a:srgbClr val="E0E0E0"/>
             </a:solidFill>
             <a:prstDash val="solid"/>
           </a:ln>
@@ -4730,7 +4672,7 @@
             <a:r>
               <a:rPr lang="en-US" sz="700" dirty="0">
                 <a:solidFill>
-                  <a:srgbClr val="2C3E50"/>
+                  <a:srgbClr val="333333"/>
                 </a:solidFill>
                 <a:latin typeface="Arial" pitchFamily="34" charset="0"/>
                 <a:ea typeface="Arial" pitchFamily="34" charset="-122"/>
@@ -4775,7 +4717,7 @@
             <a:r>
               <a:rPr lang="en-US" sz="700" b="1" dirty="0">
                 <a:solidFill>
-                  <a:srgbClr val="1C2833"/>
+                  <a:srgbClr val="1C4587"/>
                 </a:solidFill>
                 <a:latin typeface="Arial" pitchFamily="34" charset="0"/>
                 <a:ea typeface="Arial" pitchFamily="34" charset="-122"/>
@@ -4820,7 +4762,7 @@
             <a:r>
               <a:rPr lang="en-US" sz="700" b="1" dirty="0">
                 <a:solidFill>
-                  <a:srgbClr val="1C2833"/>
+                  <a:srgbClr val="1C4587"/>
                 </a:solidFill>
                 <a:latin typeface="Arial" pitchFamily="34" charset="0"/>
                 <a:ea typeface="Arial" pitchFamily="34" charset="-122"/>
@@ -4865,7 +4807,7 @@
             <a:r>
               <a:rPr lang="en-US" sz="700" b="1" dirty="0">
                 <a:solidFill>
-                  <a:srgbClr val="1C2833"/>
+                  <a:srgbClr val="1C4587"/>
                 </a:solidFill>
                 <a:latin typeface="Arial" pitchFamily="34" charset="0"/>
                 <a:ea typeface="Arial" pitchFamily="34" charset="-122"/>
@@ -4894,7 +4836,7 @@
           <a:noFill/>
           <a:ln w="9525">
             <a:solidFill>
-              <a:srgbClr val="ECF0F1"/>
+              <a:srgbClr val="E0E0E0"/>
             </a:solidFill>
             <a:prstDash val="solid"/>
           </a:ln>
@@ -4933,7 +4875,7 @@
             <a:r>
               <a:rPr lang="en-US" sz="700" dirty="0">
                 <a:solidFill>
-                  <a:srgbClr val="2C3E50"/>
+                  <a:srgbClr val="333333"/>
                 </a:solidFill>
                 <a:latin typeface="Arial" pitchFamily="34" charset="0"/>
                 <a:ea typeface="Arial" pitchFamily="34" charset="-122"/>
@@ -4978,7 +4920,7 @@
             <a:r>
               <a:rPr lang="en-US" sz="700" b="1" dirty="0">
                 <a:solidFill>
-                  <a:srgbClr val="1C2833"/>
+                  <a:srgbClr val="1C4587"/>
                 </a:solidFill>
                 <a:latin typeface="Arial" pitchFamily="34" charset="0"/>
                 <a:ea typeface="Arial" pitchFamily="34" charset="-122"/>
@@ -5023,7 +4965,7 @@
             <a:r>
               <a:rPr lang="en-US" sz="700" b="1" dirty="0">
                 <a:solidFill>
-                  <a:srgbClr val="27AE60"/>
+                  <a:srgbClr val="50B432"/>
                 </a:solidFill>
                 <a:latin typeface="Arial" pitchFamily="34" charset="0"/>
                 <a:ea typeface="Arial" pitchFamily="34" charset="-122"/>
@@ -5068,7 +5010,7 @@
             <a:r>
               <a:rPr lang="en-US" sz="700" b="1" dirty="0">
                 <a:solidFill>
-                  <a:srgbClr val="1C2833"/>
+                  <a:srgbClr val="1C4587"/>
                 </a:solidFill>
                 <a:latin typeface="Arial" pitchFamily="34" charset="0"/>
                 <a:ea typeface="Arial" pitchFamily="34" charset="-122"/>
@@ -5095,7 +5037,7 @@
             <a:avLst/>
           </a:prstGeom>
           <a:solidFill>
-            <a:srgbClr val="F8F9FA"/>
+            <a:srgbClr val="E8E8E8"/>
           </a:solidFill>
           <a:ln/>
         </p:spPr>
@@ -5143,7 +5085,7 @@
             <a:r>
               <a:rPr lang="en-US" sz="700" b="1" dirty="0">
                 <a:solidFill>
-                  <a:srgbClr val="2C3E50"/>
+                  <a:srgbClr val="333333"/>
                 </a:solidFill>
                 <a:latin typeface="Arial" pitchFamily="34" charset="0"/>
                 <a:ea typeface="Arial" pitchFamily="34" charset="-122"/>
@@ -5188,7 +5130,7 @@
             <a:r>
               <a:rPr lang="en-US" sz="700" b="1" dirty="0">
                 <a:solidFill>
-                  <a:srgbClr val="1C2833"/>
+                  <a:srgbClr val="1C4587"/>
                 </a:solidFill>
                 <a:latin typeface="Arial" pitchFamily="34" charset="0"/>
                 <a:ea typeface="Arial" pitchFamily="34" charset="-122"/>
@@ -5233,7 +5175,7 @@
             <a:r>
               <a:rPr lang="en-US" sz="700" b="1" dirty="0">
                 <a:solidFill>
-                  <a:srgbClr val="27AE60"/>
+                  <a:srgbClr val="50B432"/>
                 </a:solidFill>
                 <a:latin typeface="Arial" pitchFamily="34" charset="0"/>
                 <a:ea typeface="Arial" pitchFamily="34" charset="-122"/>
@@ -5278,7 +5220,7 @@
             <a:r>
               <a:rPr lang="en-US" sz="700" b="1" dirty="0">
                 <a:solidFill>
-                  <a:srgbClr val="27AE60"/>
+                  <a:srgbClr val="50B432"/>
                 </a:solidFill>
                 <a:latin typeface="Arial" pitchFamily="34" charset="0"/>
                 <a:ea typeface="Arial" pitchFamily="34" charset="-122"/>
@@ -5320,7 +5262,7 @@
             <a:r>
               <a:rPr lang="en-US" sz="900" b="1" dirty="0">
                 <a:solidFill>
-                  <a:srgbClr val="1C2833"/>
+                  <a:srgbClr val="1C4587"/>
                 </a:solidFill>
                 <a:latin typeface="Arial" pitchFamily="34" charset="0"/>
                 <a:ea typeface="Arial" pitchFamily="34" charset="-122"/>
@@ -5349,7 +5291,7 @@
             </a:avLst>
           </a:prstGeom>
           <a:solidFill>
-            <a:srgbClr val="FFFFFF"/>
+            <a:srgbClr val="F8F9FA"/>
           </a:solidFill>
           <a:ln/>
         </p:spPr>
@@ -5381,7 +5323,7 @@
           <a:noFill/>
           <a:ln w="9525">
             <a:solidFill>
-              <a:srgbClr val="ECF0F1"/>
+              <a:srgbClr val="E0E0E0"/>
             </a:solidFill>
             <a:prstDash val="solid"/>
           </a:ln>
@@ -5414,7 +5356,7 @@
             <a:r>
               <a:rPr lang="en-US" sz="700" dirty="0">
                 <a:solidFill>
-                  <a:srgbClr val="2C3E50"/>
+                  <a:srgbClr val="333333"/>
                 </a:solidFill>
                 <a:latin typeface="Arial" pitchFamily="34" charset="0"/>
                 <a:ea typeface="Arial" pitchFamily="34" charset="-122"/>
@@ -5443,7 +5385,7 @@
             </a:avLst>
           </a:prstGeom>
           <a:solidFill>
-            <a:srgbClr val="D5F5E3"/>
+            <a:srgbClr val="E8F5E9"/>
           </a:solidFill>
           <a:ln/>
         </p:spPr>
@@ -5485,7 +5427,7 @@
             <a:r>
               <a:rPr lang="en-US" sz="600" b="1" dirty="0">
                 <a:solidFill>
-                  <a:srgbClr val="1E8449"/>
+                  <a:srgbClr val="50B432"/>
                 </a:solidFill>
                 <a:latin typeface="Arial" pitchFamily="34" charset="0"/>
                 <a:ea typeface="Arial" pitchFamily="34" charset="-122"/>
@@ -5514,7 +5456,7 @@
           <a:noFill/>
           <a:ln w="9525">
             <a:solidFill>
-              <a:srgbClr val="ECF0F1"/>
+              <a:srgbClr val="E0E0E0"/>
             </a:solidFill>
             <a:prstDash val="solid"/>
           </a:ln>
@@ -5547,7 +5489,7 @@
             <a:r>
               <a:rPr lang="en-US" sz="700" dirty="0">
                 <a:solidFill>
-                  <a:srgbClr val="2C3E50"/>
+                  <a:srgbClr val="333333"/>
                 </a:solidFill>
                 <a:latin typeface="Arial" pitchFamily="34" charset="0"/>
                 <a:ea typeface="Arial" pitchFamily="34" charset="-122"/>
@@ -5576,7 +5518,7 @@
             </a:avLst>
           </a:prstGeom>
           <a:solidFill>
-            <a:srgbClr val="FADBD8"/>
+            <a:srgbClr val="FFEBEE"/>
           </a:solidFill>
           <a:ln/>
         </p:spPr>
@@ -5618,7 +5560,7 @@
             <a:r>
               <a:rPr lang="en-US" sz="600" b="1" dirty="0">
                 <a:solidFill>
-                  <a:srgbClr val="922B21"/>
+                  <a:srgbClr val="ED561B"/>
                 </a:solidFill>
                 <a:latin typeface="Arial" pitchFamily="34" charset="0"/>
                 <a:ea typeface="Arial" pitchFamily="34" charset="-122"/>
@@ -5647,7 +5589,7 @@
           <a:noFill/>
           <a:ln w="9525">
             <a:solidFill>
-              <a:srgbClr val="ECF0F1"/>
+              <a:srgbClr val="E0E0E0"/>
             </a:solidFill>
             <a:prstDash val="solid"/>
           </a:ln>
@@ -5680,7 +5622,7 @@
             <a:r>
               <a:rPr lang="en-US" sz="700" dirty="0">
                 <a:solidFill>
-                  <a:srgbClr val="2C3E50"/>
+                  <a:srgbClr val="333333"/>
                 </a:solidFill>
                 <a:latin typeface="Arial" pitchFamily="34" charset="0"/>
                 <a:ea typeface="Arial" pitchFamily="34" charset="-122"/>
@@ -5709,7 +5651,7 @@
             </a:avLst>
           </a:prstGeom>
           <a:solidFill>
-            <a:srgbClr val="FADBD8"/>
+            <a:srgbClr val="FFEBEE"/>
           </a:solidFill>
           <a:ln/>
         </p:spPr>
@@ -5751,7 +5693,7 @@
             <a:r>
               <a:rPr lang="en-US" sz="600" b="1" dirty="0">
                 <a:solidFill>
-                  <a:srgbClr val="922B21"/>
+                  <a:srgbClr val="ED561B"/>
                 </a:solidFill>
                 <a:latin typeface="Arial" pitchFamily="34" charset="0"/>
                 <a:ea typeface="Arial" pitchFamily="34" charset="-122"/>
@@ -5780,7 +5722,7 @@
           <a:noFill/>
           <a:ln w="9525">
             <a:solidFill>
-              <a:srgbClr val="ECF0F1"/>
+              <a:srgbClr val="E0E0E0"/>
             </a:solidFill>
             <a:prstDash val="solid"/>
           </a:ln>
@@ -5813,7 +5755,7 @@
             <a:r>
               <a:rPr lang="en-US" sz="700" dirty="0">
                 <a:solidFill>
-                  <a:srgbClr val="2C3E50"/>
+                  <a:srgbClr val="333333"/>
                 </a:solidFill>
                 <a:latin typeface="Arial" pitchFamily="34" charset="0"/>
                 <a:ea typeface="Arial" pitchFamily="34" charset="-122"/>
@@ -5842,7 +5784,7 @@
             </a:avLst>
           </a:prstGeom>
           <a:solidFill>
-            <a:srgbClr val="D5F5E3"/>
+            <a:srgbClr val="E8F5E9"/>
           </a:solidFill>
           <a:ln/>
         </p:spPr>
@@ -5884,7 +5826,7 @@
             <a:r>
               <a:rPr lang="en-US" sz="600" b="1" dirty="0">
                 <a:solidFill>
-                  <a:srgbClr val="1E8449"/>
+                  <a:srgbClr val="50B432"/>
                 </a:solidFill>
                 <a:latin typeface="Arial" pitchFamily="34" charset="0"/>
                 <a:ea typeface="Arial" pitchFamily="34" charset="-122"/>
@@ -5923,7 +5865,7 @@
             <a:r>
               <a:rPr lang="en-US" sz="700" dirty="0">
                 <a:solidFill>
-                  <a:srgbClr val="2C3E50"/>
+                  <a:srgbClr val="333333"/>
                 </a:solidFill>
                 <a:latin typeface="Arial" pitchFamily="34" charset="0"/>
                 <a:ea typeface="Arial" pitchFamily="34" charset="-122"/>
@@ -5952,7 +5894,7 @@
             </a:avLst>
           </a:prstGeom>
           <a:solidFill>
-            <a:srgbClr val="D5F5E3"/>
+            <a:srgbClr val="E8F5E9"/>
           </a:solidFill>
           <a:ln/>
         </p:spPr>
@@ -5994,7 +5936,7 @@
             <a:r>
               <a:rPr lang="en-US" sz="600" b="1" dirty="0">
                 <a:solidFill>
-                  <a:srgbClr val="1E8449"/>
+                  <a:srgbClr val="50B432"/>
                 </a:solidFill>
                 <a:latin typeface="Arial" pitchFamily="34" charset="0"/>
                 <a:ea typeface="Arial" pitchFamily="34" charset="-122"/>
@@ -6039,7 +5981,7 @@
             <a:r>
               <a:rPr lang="en-US" sz="900" b="1" dirty="0">
                 <a:solidFill>
-                  <a:srgbClr val="1C2833"/>
+                  <a:srgbClr val="1C4587"/>
                 </a:solidFill>
                 <a:latin typeface="Arial" pitchFamily="34" charset="0"/>
                 <a:ea typeface="Arial" pitchFamily="34" charset="-122"/>
@@ -6081,7 +6023,7 @@
     <p:bg>
       <p:bgPr>
         <a:solidFill>
-          <a:srgbClr val="F4F6F6"/>
+          <a:srgbClr val="FFFFFF"/>
         </a:solidFill>
       </p:bgPr>
     </p:bg>
@@ -6114,7 +6056,7 @@
             <a:avLst/>
           </a:prstGeom>
           <a:solidFill>
-            <a:srgbClr val="1C2833"/>
+            <a:srgbClr val="1C4587"/>
           </a:solidFill>
           <a:ln/>
         </p:spPr>
@@ -6198,7 +6140,7 @@
             <a:r>
               <a:rPr lang="en-US" sz="1000" b="1" dirty="0">
                 <a:solidFill>
-                  <a:srgbClr val="1C2833"/>
+                  <a:srgbClr val="1C4587"/>
                 </a:solidFill>
                 <a:latin typeface="Arial" pitchFamily="34" charset="0"/>
                 <a:ea typeface="Arial" pitchFamily="34" charset="-122"/>
@@ -6227,16 +6169,9 @@
             </a:avLst>
           </a:prstGeom>
           <a:solidFill>
-            <a:srgbClr val="FFFFFF"/>
+            <a:srgbClr val="F8F9FA"/>
           </a:solidFill>
           <a:ln/>
-          <a:effectLst>
-            <a:outerShdw sx="100000" sy="100000" kx="0" ky="0" algn="bl" rotWithShape="0" blurRad="38100" dist="13470" dir="2700000">
-              <a:srgbClr val="000000">
-                <a:alpha val="8000"/>
-              </a:srgbClr>
-            </a:outerShdw>
-          </a:effectLst>
         </p:spPr>
         <p:txBody>
           <a:bodyPr wrap="square" rtlCol="0" anchor="ctr"/>
@@ -6266,7 +6201,7 @@
           <a:noFill/>
           <a:ln w="38100">
             <a:solidFill>
-              <a:srgbClr val="27AE60"/>
+              <a:srgbClr val="50B432"/>
             </a:solidFill>
             <a:prstDash val="solid"/>
           </a:ln>
@@ -6299,7 +6234,7 @@
             <a:r>
               <a:rPr lang="en-US" sz="900" b="1" dirty="0">
                 <a:solidFill>
-                  <a:srgbClr val="2C3E50"/>
+                  <a:srgbClr val="333333"/>
                 </a:solidFill>
                 <a:latin typeface="Arial" pitchFamily="34" charset="0"/>
                 <a:ea typeface="Arial" pitchFamily="34" charset="-122"/>
@@ -6338,7 +6273,7 @@
             <a:r>
               <a:rPr lang="en-US" sz="1000" b="1" dirty="0">
                 <a:solidFill>
-                  <a:srgbClr val="27AE60"/>
+                  <a:srgbClr val="50B432"/>
                 </a:solidFill>
                 <a:latin typeface="Arial" pitchFamily="34" charset="0"/>
                 <a:ea typeface="Arial" pitchFamily="34" charset="-122"/>
@@ -6380,7 +6315,7 @@
             <a:r>
               <a:rPr lang="en-US" sz="700" dirty="0">
                 <a:solidFill>
-                  <a:srgbClr val="7F8C8D"/>
+                  <a:srgbClr val="666666"/>
                 </a:solidFill>
                 <a:latin typeface="Arial" pitchFamily="34" charset="0"/>
                 <a:ea typeface="Arial" pitchFamily="34" charset="-122"/>
@@ -6409,16 +6344,9 @@
             </a:avLst>
           </a:prstGeom>
           <a:solidFill>
-            <a:srgbClr val="FFFFFF"/>
+            <a:srgbClr val="F8F9FA"/>
           </a:solidFill>
           <a:ln/>
-          <a:effectLst>
-            <a:outerShdw sx="100000" sy="100000" kx="0" ky="0" algn="bl" rotWithShape="0" blurRad="38100" dist="13470" dir="2700000">
-              <a:srgbClr val="000000">
-                <a:alpha val="8000"/>
-              </a:srgbClr>
-            </a:outerShdw>
-          </a:effectLst>
         </p:spPr>
         <p:txBody>
           <a:bodyPr wrap="square" rtlCol="0" anchor="ctr"/>
@@ -6448,7 +6376,7 @@
           <a:noFill/>
           <a:ln w="38100">
             <a:solidFill>
-              <a:srgbClr val="27AE60"/>
+              <a:srgbClr val="50B432"/>
             </a:solidFill>
             <a:prstDash val="solid"/>
           </a:ln>
@@ -6481,7 +6409,7 @@
             <a:r>
               <a:rPr lang="en-US" sz="900" b="1" dirty="0">
                 <a:solidFill>
-                  <a:srgbClr val="2C3E50"/>
+                  <a:srgbClr val="333333"/>
                 </a:solidFill>
                 <a:latin typeface="Arial" pitchFamily="34" charset="0"/>
                 <a:ea typeface="Arial" pitchFamily="34" charset="-122"/>
@@ -6520,7 +6448,7 @@
             <a:r>
               <a:rPr lang="en-US" sz="1000" b="1" dirty="0">
                 <a:solidFill>
-                  <a:srgbClr val="27AE60"/>
+                  <a:srgbClr val="50B432"/>
                 </a:solidFill>
                 <a:latin typeface="Arial" pitchFamily="34" charset="0"/>
                 <a:ea typeface="Arial" pitchFamily="34" charset="-122"/>
@@ -6562,7 +6490,7 @@
             <a:r>
               <a:rPr lang="en-US" sz="700" dirty="0">
                 <a:solidFill>
-                  <a:srgbClr val="7F8C8D"/>
+                  <a:srgbClr val="666666"/>
                 </a:solidFill>
                 <a:latin typeface="Arial" pitchFamily="34" charset="0"/>
                 <a:ea typeface="Arial" pitchFamily="34" charset="-122"/>
@@ -6591,16 +6519,9 @@
             </a:avLst>
           </a:prstGeom>
           <a:solidFill>
-            <a:srgbClr val="FFFFFF"/>
+            <a:srgbClr val="F8F9FA"/>
           </a:solidFill>
           <a:ln/>
-          <a:effectLst>
-            <a:outerShdw sx="100000" sy="100000" kx="0" ky="0" algn="bl" rotWithShape="0" blurRad="38100" dist="13470" dir="2700000">
-              <a:srgbClr val="000000">
-                <a:alpha val="8000"/>
-              </a:srgbClr>
-            </a:outerShdw>
-          </a:effectLst>
         </p:spPr>
         <p:txBody>
           <a:bodyPr wrap="square" rtlCol="0" anchor="ctr"/>
@@ -6630,7 +6551,7 @@
           <a:noFill/>
           <a:ln w="38100">
             <a:solidFill>
-              <a:srgbClr val="27AE60"/>
+              <a:srgbClr val="50B432"/>
             </a:solidFill>
             <a:prstDash val="solid"/>
           </a:ln>
@@ -6663,7 +6584,7 @@
             <a:r>
               <a:rPr lang="en-US" sz="900" b="1" dirty="0">
                 <a:solidFill>
-                  <a:srgbClr val="2C3E50"/>
+                  <a:srgbClr val="333333"/>
                 </a:solidFill>
                 <a:latin typeface="Arial" pitchFamily="34" charset="0"/>
                 <a:ea typeface="Arial" pitchFamily="34" charset="-122"/>
@@ -6702,7 +6623,7 @@
             <a:r>
               <a:rPr lang="en-US" sz="1000" b="1" dirty="0">
                 <a:solidFill>
-                  <a:srgbClr val="27AE60"/>
+                  <a:srgbClr val="50B432"/>
                 </a:solidFill>
                 <a:latin typeface="Arial" pitchFamily="34" charset="0"/>
                 <a:ea typeface="Arial" pitchFamily="34" charset="-122"/>
@@ -6744,7 +6665,7 @@
             <a:r>
               <a:rPr lang="en-US" sz="700" dirty="0">
                 <a:solidFill>
-                  <a:srgbClr val="7F8C8D"/>
+                  <a:srgbClr val="666666"/>
                 </a:solidFill>
                 <a:latin typeface="Arial" pitchFamily="34" charset="0"/>
                 <a:ea typeface="Arial" pitchFamily="34" charset="-122"/>
@@ -6773,16 +6694,9 @@
             </a:avLst>
           </a:prstGeom>
           <a:solidFill>
-            <a:srgbClr val="FFFFFF"/>
+            <a:srgbClr val="F8F9FA"/>
           </a:solidFill>
           <a:ln/>
-          <a:effectLst>
-            <a:outerShdw sx="100000" sy="100000" kx="0" ky="0" algn="bl" rotWithShape="0" blurRad="38100" dist="13470" dir="2700000">
-              <a:srgbClr val="000000">
-                <a:alpha val="8000"/>
-              </a:srgbClr>
-            </a:outerShdw>
-          </a:effectLst>
         </p:spPr>
         <p:txBody>
           <a:bodyPr wrap="square" rtlCol="0" anchor="ctr"/>
@@ -6812,7 +6726,7 @@
           <a:noFill/>
           <a:ln w="38100">
             <a:solidFill>
-              <a:srgbClr val="27AE60"/>
+              <a:srgbClr val="50B432"/>
             </a:solidFill>
             <a:prstDash val="solid"/>
           </a:ln>
@@ -6845,7 +6759,7 @@
             <a:r>
               <a:rPr lang="en-US" sz="900" b="1" dirty="0">
                 <a:solidFill>
-                  <a:srgbClr val="2C3E50"/>
+                  <a:srgbClr val="333333"/>
                 </a:solidFill>
                 <a:latin typeface="Arial" pitchFamily="34" charset="0"/>
                 <a:ea typeface="Arial" pitchFamily="34" charset="-122"/>
@@ -6884,7 +6798,7 @@
             <a:r>
               <a:rPr lang="en-US" sz="1000" b="1" dirty="0">
                 <a:solidFill>
-                  <a:srgbClr val="27AE60"/>
+                  <a:srgbClr val="50B432"/>
                 </a:solidFill>
                 <a:latin typeface="Arial" pitchFamily="34" charset="0"/>
                 <a:ea typeface="Arial" pitchFamily="34" charset="-122"/>
@@ -6926,7 +6840,7 @@
             <a:r>
               <a:rPr lang="en-US" sz="700" dirty="0">
                 <a:solidFill>
-                  <a:srgbClr val="7F8C8D"/>
+                  <a:srgbClr val="666666"/>
                 </a:solidFill>
                 <a:latin typeface="Arial" pitchFamily="34" charset="0"/>
                 <a:ea typeface="Arial" pitchFamily="34" charset="-122"/>
@@ -6955,16 +6869,9 @@
             </a:avLst>
           </a:prstGeom>
           <a:solidFill>
-            <a:srgbClr val="FFFFFF"/>
+            <a:srgbClr val="F8F9FA"/>
           </a:solidFill>
           <a:ln/>
-          <a:effectLst>
-            <a:outerShdw sx="100000" sy="100000" kx="0" ky="0" algn="bl" rotWithShape="0" blurRad="38100" dist="13470" dir="2700000">
-              <a:srgbClr val="000000">
-                <a:alpha val="8000"/>
-              </a:srgbClr>
-            </a:outerShdw>
-          </a:effectLst>
         </p:spPr>
         <p:txBody>
           <a:bodyPr wrap="square" rtlCol="0" anchor="ctr"/>
@@ -6994,7 +6901,7 @@
           <a:noFill/>
           <a:ln w="38100">
             <a:solidFill>
-              <a:srgbClr val="27AE60"/>
+              <a:srgbClr val="50B432"/>
             </a:solidFill>
             <a:prstDash val="solid"/>
           </a:ln>
@@ -7027,7 +6934,7 @@
             <a:r>
               <a:rPr lang="en-US" sz="900" b="1" dirty="0">
                 <a:solidFill>
-                  <a:srgbClr val="2C3E50"/>
+                  <a:srgbClr val="333333"/>
                 </a:solidFill>
                 <a:latin typeface="Arial" pitchFamily="34" charset="0"/>
                 <a:ea typeface="Arial" pitchFamily="34" charset="-122"/>
@@ -7066,7 +6973,7 @@
             <a:r>
               <a:rPr lang="en-US" sz="1000" b="1" dirty="0">
                 <a:solidFill>
-                  <a:srgbClr val="27AE60"/>
+                  <a:srgbClr val="50B432"/>
                 </a:solidFill>
                 <a:latin typeface="Arial" pitchFamily="34" charset="0"/>
                 <a:ea typeface="Arial" pitchFamily="34" charset="-122"/>
@@ -7108,7 +7015,7 @@
             <a:r>
               <a:rPr lang="en-US" sz="700" dirty="0">
                 <a:solidFill>
-                  <a:srgbClr val="7F8C8D"/>
+                  <a:srgbClr val="666666"/>
                 </a:solidFill>
                 <a:latin typeface="Arial" pitchFamily="34" charset="0"/>
                 <a:ea typeface="Arial" pitchFamily="34" charset="-122"/>
@@ -7150,7 +7057,7 @@
             <a:r>
               <a:rPr lang="en-US" sz="1000" b="1" dirty="0">
                 <a:solidFill>
-                  <a:srgbClr val="1C2833"/>
+                  <a:srgbClr val="1C4587"/>
                 </a:solidFill>
                 <a:latin typeface="Arial" pitchFamily="34" charset="0"/>
                 <a:ea typeface="Arial" pitchFamily="34" charset="-122"/>
@@ -7179,16 +7086,9 @@
             </a:avLst>
           </a:prstGeom>
           <a:solidFill>
-            <a:srgbClr val="FFFFFF"/>
+            <a:srgbClr val="F8F9FA"/>
           </a:solidFill>
           <a:ln/>
-          <a:effectLst>
-            <a:outerShdw sx="100000" sy="100000" kx="0" ky="0" algn="bl" rotWithShape="0" blurRad="38100" dist="13470" dir="2700000">
-              <a:srgbClr val="000000">
-                <a:alpha val="8000"/>
-              </a:srgbClr>
-            </a:outerShdw>
-          </a:effectLst>
         </p:spPr>
         <p:txBody>
           <a:bodyPr wrap="square" rtlCol="0" anchor="ctr"/>
@@ -7218,7 +7118,7 @@
           <a:noFill/>
           <a:ln w="38100">
             <a:solidFill>
-              <a:srgbClr val="C0392B"/>
+              <a:srgbClr val="ED561B"/>
             </a:solidFill>
             <a:prstDash val="solid"/>
           </a:ln>
@@ -7251,7 +7151,7 @@
             <a:r>
               <a:rPr lang="en-US" sz="900" b="1" dirty="0">
                 <a:solidFill>
-                  <a:srgbClr val="2C3E50"/>
+                  <a:srgbClr val="333333"/>
                 </a:solidFill>
                 <a:latin typeface="Arial" pitchFamily="34" charset="0"/>
                 <a:ea typeface="Arial" pitchFamily="34" charset="-122"/>
@@ -7290,7 +7190,7 @@
             <a:r>
               <a:rPr lang="en-US" sz="1000" b="1" dirty="0">
                 <a:solidFill>
-                  <a:srgbClr val="C0392B"/>
+                  <a:srgbClr val="ED561B"/>
                 </a:solidFill>
                 <a:latin typeface="Arial" pitchFamily="34" charset="0"/>
                 <a:ea typeface="Arial" pitchFamily="34" charset="-122"/>
@@ -7332,7 +7232,7 @@
             <a:r>
               <a:rPr lang="en-US" sz="700" dirty="0">
                 <a:solidFill>
-                  <a:srgbClr val="7F8C8D"/>
+                  <a:srgbClr val="666666"/>
                 </a:solidFill>
                 <a:latin typeface="Arial" pitchFamily="34" charset="0"/>
                 <a:ea typeface="Arial" pitchFamily="34" charset="-122"/>
@@ -7361,16 +7261,9 @@
             </a:avLst>
           </a:prstGeom>
           <a:solidFill>
-            <a:srgbClr val="FFFFFF"/>
+            <a:srgbClr val="F8F9FA"/>
           </a:solidFill>
           <a:ln/>
-          <a:effectLst>
-            <a:outerShdw sx="100000" sy="100000" kx="0" ky="0" algn="bl" rotWithShape="0" blurRad="38100" dist="13470" dir="2700000">
-              <a:srgbClr val="000000">
-                <a:alpha val="8000"/>
-              </a:srgbClr>
-            </a:outerShdw>
-          </a:effectLst>
         </p:spPr>
         <p:txBody>
           <a:bodyPr wrap="square" rtlCol="0" anchor="ctr"/>
@@ -7400,7 +7293,7 @@
           <a:noFill/>
           <a:ln w="38100">
             <a:solidFill>
-              <a:srgbClr val="C0392B"/>
+              <a:srgbClr val="ED561B"/>
             </a:solidFill>
             <a:prstDash val="solid"/>
           </a:ln>
@@ -7433,7 +7326,7 @@
             <a:r>
               <a:rPr lang="en-US" sz="900" b="1" dirty="0">
                 <a:solidFill>
-                  <a:srgbClr val="2C3E50"/>
+                  <a:srgbClr val="333333"/>
                 </a:solidFill>
                 <a:latin typeface="Arial" pitchFamily="34" charset="0"/>
                 <a:ea typeface="Arial" pitchFamily="34" charset="-122"/>
@@ -7472,7 +7365,7 @@
             <a:r>
               <a:rPr lang="en-US" sz="1000" b="1" dirty="0">
                 <a:solidFill>
-                  <a:srgbClr val="C0392B"/>
+                  <a:srgbClr val="ED561B"/>
                 </a:solidFill>
                 <a:latin typeface="Arial" pitchFamily="34" charset="0"/>
                 <a:ea typeface="Arial" pitchFamily="34" charset="-122"/>
@@ -7514,7 +7407,7 @@
             <a:r>
               <a:rPr lang="en-US" sz="700" dirty="0">
                 <a:solidFill>
-                  <a:srgbClr val="7F8C8D"/>
+                  <a:srgbClr val="666666"/>
                 </a:solidFill>
                 <a:latin typeface="Arial" pitchFamily="34" charset="0"/>
                 <a:ea typeface="Arial" pitchFamily="34" charset="-122"/>
@@ -7543,7 +7436,7 @@
             </a:avLst>
           </a:prstGeom>
           <a:solidFill>
-            <a:srgbClr val="FEF9E7"/>
+            <a:srgbClr val="FFF8E1"/>
           </a:solidFill>
           <a:ln/>
         </p:spPr>
@@ -7575,7 +7468,7 @@
           <a:noFill/>
           <a:ln w="38100">
             <a:solidFill>
-              <a:srgbClr val="F39C12"/>
+              <a:srgbClr val="ED561B"/>
             </a:solidFill>
             <a:prstDash val="solid"/>
           </a:ln>
@@ -7611,7 +7504,7 @@
             <a:r>
               <a:rPr lang="en-US" sz="900" b="1" dirty="0">
                 <a:solidFill>
-                  <a:srgbClr val="9A7D0A"/>
+                  <a:srgbClr val="E65100"/>
                 </a:solidFill>
                 <a:latin typeface="Arial" pitchFamily="34" charset="0"/>
                 <a:ea typeface="Arial" pitchFamily="34" charset="-122"/>
@@ -7653,7 +7546,7 @@
             <a:r>
               <a:rPr lang="en-US" sz="800" dirty="0">
                 <a:solidFill>
-                  <a:srgbClr val="7D6608"/>
+                  <a:srgbClr val="BF360C"/>
                 </a:solidFill>
                 <a:latin typeface="Arial" pitchFamily="34" charset="0"/>
                 <a:ea typeface="Arial" pitchFamily="34" charset="-122"/>
@@ -7695,7 +7588,7 @@
             <a:r>
               <a:rPr lang="en-US" sz="800" dirty="0">
                 <a:solidFill>
-                  <a:srgbClr val="7D6608"/>
+                  <a:srgbClr val="BF360C"/>
                 </a:solidFill>
                 <a:latin typeface="Arial" pitchFamily="34" charset="0"/>
                 <a:ea typeface="Arial" pitchFamily="34" charset="-122"/>
@@ -7737,7 +7630,7 @@
             <a:r>
               <a:rPr lang="en-US" sz="800" dirty="0">
                 <a:solidFill>
-                  <a:srgbClr val="7D6608"/>
+                  <a:srgbClr val="BF360C"/>
                 </a:solidFill>
                 <a:latin typeface="Arial" pitchFamily="34" charset="0"/>
                 <a:ea typeface="Arial" pitchFamily="34" charset="-122"/>
@@ -7766,7 +7659,7 @@
             </a:avLst>
           </a:prstGeom>
           <a:solidFill>
-            <a:srgbClr val="1C2833"/>
+            <a:srgbClr val="1C4587"/>
           </a:solidFill>
           <a:ln/>
         </p:spPr>
@@ -7808,7 +7701,7 @@
             <a:r>
               <a:rPr lang="en-US" sz="900" dirty="0">
                 <a:solidFill>
-                  <a:srgbClr val="BDC3C7"/>
+                  <a:srgbClr val="AAAAAA"/>
                 </a:solidFill>
                 <a:latin typeface="Arial" pitchFamily="34" charset="0"/>
                 <a:ea typeface="Arial" pitchFamily="34" charset="-122"/>
@@ -7850,7 +7743,7 @@
             <a:r>
               <a:rPr lang="en-US" sz="1600" b="1" dirty="0">
                 <a:solidFill>
-                  <a:srgbClr val="27AE60"/>
+                  <a:srgbClr val="50B432"/>
                 </a:solidFill>
                 <a:latin typeface="Arial" pitchFamily="34" charset="0"/>
                 <a:ea typeface="Arial" pitchFamily="34" charset="-122"/>
@@ -7876,7 +7769,7 @@
     <p:bg>
       <p:bgPr>
         <a:solidFill>
-          <a:srgbClr val="F4F6F6"/>
+          <a:srgbClr val="FFFFFF"/>
         </a:solidFill>
       </p:bgPr>
     </p:bg>
@@ -7909,7 +7802,7 @@
             <a:avLst/>
           </a:prstGeom>
           <a:solidFill>
-            <a:srgbClr val="C0392B"/>
+            <a:srgbClr val="ED561B"/>
           </a:solidFill>
           <a:ln/>
         </p:spPr>
@@ -7980,16 +7873,9 @@
             </a:avLst>
           </a:prstGeom>
           <a:solidFill>
-            <a:srgbClr val="FFFFFF"/>
+            <a:srgbClr val="F8F9FA"/>
           </a:solidFill>
           <a:ln/>
-          <a:effectLst>
-            <a:outerShdw sx="100000" sy="100000" kx="0" ky="0" algn="bl" rotWithShape="0" blurRad="38100" dist="13470" dir="2700000">
-              <a:srgbClr val="000000">
-                <a:alpha val="8000"/>
-              </a:srgbClr>
-            </a:outerShdw>
-          </a:effectLst>
         </p:spPr>
         <p:txBody>
           <a:bodyPr wrap="square" rtlCol="0" anchor="ctr"/>
@@ -8029,7 +7915,7 @@
             <a:r>
               <a:rPr lang="en-US" sz="1100" b="1" dirty="0">
                 <a:solidFill>
-                  <a:srgbClr val="C0392B"/>
+                  <a:srgbClr val="ED561B"/>
                 </a:solidFill>
                 <a:latin typeface="Arial" pitchFamily="34" charset="0"/>
                 <a:ea typeface="Arial" pitchFamily="34" charset="-122"/>
@@ -8058,7 +7944,7 @@
             </a:avLst>
           </a:prstGeom>
           <a:solidFill>
-            <a:srgbClr val="FADBD8"/>
+            <a:srgbClr val="FFEBEE"/>
           </a:solidFill>
           <a:ln/>
         </p:spPr>
@@ -8100,7 +7986,7 @@
             <a:r>
               <a:rPr lang="en-US" sz="800" b="1" dirty="0">
                 <a:solidFill>
-                  <a:srgbClr val="922B21"/>
+                  <a:srgbClr val="ED561B"/>
                 </a:solidFill>
                 <a:latin typeface="Arial" pitchFamily="34" charset="0"/>
                 <a:ea typeface="Arial" pitchFamily="34" charset="-122"/>
@@ -8142,7 +8028,7 @@
             <a:r>
               <a:rPr lang="en-US" sz="900" dirty="0">
                 <a:solidFill>
-                  <a:srgbClr val="2C3E50"/>
+                  <a:srgbClr val="333333"/>
                 </a:solidFill>
                 <a:latin typeface="Arial" pitchFamily="34" charset="0"/>
                 <a:ea typeface="Arial" pitchFamily="34" charset="-122"/>
@@ -8181,7 +8067,7 @@
             <a:r>
               <a:rPr lang="en-US" sz="800" dirty="0">
                 <a:solidFill>
-                  <a:srgbClr val="7F8C8D"/>
+                  <a:srgbClr val="666666"/>
                 </a:solidFill>
                 <a:latin typeface="Arial" pitchFamily="34" charset="0"/>
                 <a:ea typeface="Arial" pitchFamily="34" charset="-122"/>
@@ -8210,16 +8096,9 @@
             </a:avLst>
           </a:prstGeom>
           <a:solidFill>
-            <a:srgbClr val="FFFFFF"/>
+            <a:srgbClr val="F8F9FA"/>
           </a:solidFill>
           <a:ln/>
-          <a:effectLst>
-            <a:outerShdw sx="100000" sy="100000" kx="0" ky="0" algn="bl" rotWithShape="0" blurRad="38100" dist="13470" dir="2700000">
-              <a:srgbClr val="000000">
-                <a:alpha val="8000"/>
-              </a:srgbClr>
-            </a:outerShdw>
-          </a:effectLst>
         </p:spPr>
         <p:txBody>
           <a:bodyPr wrap="square" rtlCol="0" anchor="ctr"/>
@@ -8259,7 +8138,7 @@
             <a:r>
               <a:rPr lang="en-US" sz="1100" b="1" dirty="0">
                 <a:solidFill>
-                  <a:srgbClr val="C0392B"/>
+                  <a:srgbClr val="ED561B"/>
                 </a:solidFill>
                 <a:latin typeface="Arial" pitchFamily="34" charset="0"/>
                 <a:ea typeface="Arial" pitchFamily="34" charset="-122"/>
@@ -8288,7 +8167,7 @@
             </a:avLst>
           </a:prstGeom>
           <a:solidFill>
-            <a:srgbClr val="FADBD8"/>
+            <a:srgbClr val="FFEBEE"/>
           </a:solidFill>
           <a:ln/>
         </p:spPr>
@@ -8330,7 +8209,7 @@
             <a:r>
               <a:rPr lang="en-US" sz="800" b="1" dirty="0">
                 <a:solidFill>
-                  <a:srgbClr val="922B21"/>
+                  <a:srgbClr val="ED561B"/>
                 </a:solidFill>
                 <a:latin typeface="Arial" pitchFamily="34" charset="0"/>
                 <a:ea typeface="Arial" pitchFamily="34" charset="-122"/>
@@ -8372,7 +8251,7 @@
             <a:r>
               <a:rPr lang="en-US" sz="900" dirty="0">
                 <a:solidFill>
-                  <a:srgbClr val="2C3E50"/>
+                  <a:srgbClr val="333333"/>
                 </a:solidFill>
                 <a:latin typeface="Arial" pitchFamily="34" charset="0"/>
                 <a:ea typeface="Arial" pitchFamily="34" charset="-122"/>
@@ -8411,7 +8290,7 @@
             <a:r>
               <a:rPr lang="en-US" sz="800" dirty="0">
                 <a:solidFill>
-                  <a:srgbClr val="7F8C8D"/>
+                  <a:srgbClr val="666666"/>
                 </a:solidFill>
                 <a:latin typeface="Arial" pitchFamily="34" charset="0"/>
                 <a:ea typeface="Arial" pitchFamily="34" charset="-122"/>
@@ -8440,16 +8319,9 @@
             </a:avLst>
           </a:prstGeom>
           <a:solidFill>
-            <a:srgbClr val="FFFFFF"/>
+            <a:srgbClr val="F8F9FA"/>
           </a:solidFill>
           <a:ln/>
-          <a:effectLst>
-            <a:outerShdw sx="100000" sy="100000" kx="0" ky="0" algn="bl" rotWithShape="0" blurRad="38100" dist="13470" dir="2700000">
-              <a:srgbClr val="000000">
-                <a:alpha val="8000"/>
-              </a:srgbClr>
-            </a:outerShdw>
-          </a:effectLst>
         </p:spPr>
         <p:txBody>
           <a:bodyPr wrap="square" rtlCol="0" anchor="ctr"/>
@@ -8489,7 +8361,7 @@
             <a:r>
               <a:rPr lang="en-US" sz="1100" b="1" dirty="0">
                 <a:solidFill>
-                  <a:srgbClr val="C0392B"/>
+                  <a:srgbClr val="ED561B"/>
                 </a:solidFill>
                 <a:latin typeface="Arial" pitchFamily="34" charset="0"/>
                 <a:ea typeface="Arial" pitchFamily="34" charset="-122"/>
@@ -8518,7 +8390,7 @@
             </a:avLst>
           </a:prstGeom>
           <a:solidFill>
-            <a:srgbClr val="FADBD8"/>
+            <a:srgbClr val="FFEBEE"/>
           </a:solidFill>
           <a:ln/>
         </p:spPr>
@@ -8560,7 +8432,7 @@
             <a:r>
               <a:rPr lang="en-US" sz="800" b="1" dirty="0">
                 <a:solidFill>
-                  <a:srgbClr val="922B21"/>
+                  <a:srgbClr val="ED561B"/>
                 </a:solidFill>
                 <a:latin typeface="Arial" pitchFamily="34" charset="0"/>
                 <a:ea typeface="Arial" pitchFamily="34" charset="-122"/>
@@ -8602,7 +8474,7 @@
             <a:r>
               <a:rPr lang="en-US" sz="900" dirty="0">
                 <a:solidFill>
-                  <a:srgbClr val="2C3E50"/>
+                  <a:srgbClr val="333333"/>
                 </a:solidFill>
                 <a:latin typeface="Arial" pitchFamily="34" charset="0"/>
                 <a:ea typeface="Arial" pitchFamily="34" charset="-122"/>
@@ -8641,7 +8513,7 @@
             <a:r>
               <a:rPr lang="en-US" sz="800" dirty="0">
                 <a:solidFill>
-                  <a:srgbClr val="7F8C8D"/>
+                  <a:srgbClr val="666666"/>
                 </a:solidFill>
                 <a:latin typeface="Arial" pitchFamily="34" charset="0"/>
                 <a:ea typeface="Arial" pitchFamily="34" charset="-122"/>
@@ -8670,16 +8542,9 @@
             </a:avLst>
           </a:prstGeom>
           <a:solidFill>
-            <a:srgbClr val="FFFFFF"/>
+            <a:srgbClr val="F8F9FA"/>
           </a:solidFill>
           <a:ln/>
-          <a:effectLst>
-            <a:outerShdw sx="100000" sy="100000" kx="0" ky="0" algn="bl" rotWithShape="0" blurRad="38100" dist="13470" dir="2700000">
-              <a:srgbClr val="000000">
-                <a:alpha val="8000"/>
-              </a:srgbClr>
-            </a:outerShdw>
-          </a:effectLst>
         </p:spPr>
         <p:txBody>
           <a:bodyPr wrap="square" rtlCol="0" anchor="ctr"/>
@@ -8722,7 +8587,7 @@
             <a:r>
               <a:rPr lang="en-US" sz="1100" b="1" dirty="0">
                 <a:solidFill>
-                  <a:srgbClr val="1C2833"/>
+                  <a:srgbClr val="1C4587"/>
                 </a:solidFill>
                 <a:latin typeface="Arial" pitchFamily="34" charset="0"/>
                 <a:ea typeface="Arial" pitchFamily="34" charset="-122"/>
@@ -8751,7 +8616,7 @@
           <a:noFill/>
           <a:ln w="9525">
             <a:solidFill>
-              <a:srgbClr val="ECF0F1"/>
+              <a:srgbClr val="E0E0E0"/>
             </a:solidFill>
             <a:prstDash val="solid"/>
           </a:ln>
@@ -8790,7 +8655,7 @@
             <a:r>
               <a:rPr lang="en-US" sz="900" dirty="0">
                 <a:solidFill>
-                  <a:srgbClr val="2C3E50"/>
+                  <a:srgbClr val="333333"/>
                 </a:solidFill>
                 <a:latin typeface="Arial" pitchFamily="34" charset="0"/>
                 <a:ea typeface="Arial" pitchFamily="34" charset="-122"/>
@@ -8835,7 +8700,7 @@
             <a:r>
               <a:rPr lang="en-US" sz="900" b="1" dirty="0">
                 <a:solidFill>
-                  <a:srgbClr val="1C2833"/>
+                  <a:srgbClr val="1C4587"/>
                 </a:solidFill>
                 <a:latin typeface="Arial" pitchFamily="34" charset="0"/>
                 <a:ea typeface="Arial" pitchFamily="34" charset="-122"/>
@@ -8864,7 +8729,7 @@
           <a:noFill/>
           <a:ln w="9525">
             <a:solidFill>
-              <a:srgbClr val="ECF0F1"/>
+              <a:srgbClr val="E0E0E0"/>
             </a:solidFill>
             <a:prstDash val="solid"/>
           </a:ln>
@@ -8903,7 +8768,7 @@
             <a:r>
               <a:rPr lang="en-US" sz="900" dirty="0">
                 <a:solidFill>
-                  <a:srgbClr val="2C3E50"/>
+                  <a:srgbClr val="333333"/>
                 </a:solidFill>
                 <a:latin typeface="Arial" pitchFamily="34" charset="0"/>
                 <a:ea typeface="Arial" pitchFamily="34" charset="-122"/>
@@ -8948,7 +8813,7 @@
             <a:r>
               <a:rPr lang="en-US" sz="900" b="1" dirty="0">
                 <a:solidFill>
-                  <a:srgbClr val="1C2833"/>
+                  <a:srgbClr val="1C4587"/>
                 </a:solidFill>
                 <a:latin typeface="Arial" pitchFamily="34" charset="0"/>
                 <a:ea typeface="Arial" pitchFamily="34" charset="-122"/>
@@ -8977,7 +8842,7 @@
           <a:noFill/>
           <a:ln w="9525">
             <a:solidFill>
-              <a:srgbClr val="ECF0F1"/>
+              <a:srgbClr val="E0E0E0"/>
             </a:solidFill>
             <a:prstDash val="solid"/>
           </a:ln>
@@ -9016,7 +8881,7 @@
             <a:r>
               <a:rPr lang="en-US" sz="900" dirty="0">
                 <a:solidFill>
-                  <a:srgbClr val="2C3E50"/>
+                  <a:srgbClr val="333333"/>
                 </a:solidFill>
                 <a:latin typeface="Arial" pitchFamily="34" charset="0"/>
                 <a:ea typeface="Arial" pitchFamily="34" charset="-122"/>
@@ -9061,7 +8926,7 @@
             <a:r>
               <a:rPr lang="en-US" sz="900" b="1" dirty="0">
                 <a:solidFill>
-                  <a:srgbClr val="1C2833"/>
+                  <a:srgbClr val="1C4587"/>
                 </a:solidFill>
                 <a:latin typeface="Arial" pitchFamily="34" charset="0"/>
                 <a:ea typeface="Arial" pitchFamily="34" charset="-122"/>
@@ -9106,7 +8971,7 @@
             <a:r>
               <a:rPr lang="en-US" sz="900" dirty="0">
                 <a:solidFill>
-                  <a:srgbClr val="2C3E50"/>
+                  <a:srgbClr val="333333"/>
                 </a:solidFill>
                 <a:latin typeface="Arial" pitchFamily="34" charset="0"/>
                 <a:ea typeface="Arial" pitchFamily="34" charset="-122"/>
@@ -9151,7 +9016,7 @@
             <a:r>
               <a:rPr lang="en-US" sz="900" b="1" dirty="0">
                 <a:solidFill>
-                  <a:srgbClr val="C0392B"/>
+                  <a:srgbClr val="ED561B"/>
                 </a:solidFill>
                 <a:latin typeface="Arial" pitchFamily="34" charset="0"/>
                 <a:ea typeface="Arial" pitchFamily="34" charset="-122"/>
@@ -9180,16 +9045,9 @@
             </a:avLst>
           </a:prstGeom>
           <a:solidFill>
-            <a:srgbClr val="FFFFFF"/>
+            <a:srgbClr val="FFF8E1"/>
           </a:solidFill>
           <a:ln/>
-          <a:effectLst>
-            <a:outerShdw sx="100000" sy="100000" kx="0" ky="0" algn="bl" rotWithShape="0" blurRad="38100" dist="13470" dir="2700000">
-              <a:srgbClr val="000000">
-                <a:alpha val="8000"/>
-              </a:srgbClr>
-            </a:outerShdw>
-          </a:effectLst>
         </p:spPr>
         <p:txBody>
           <a:bodyPr wrap="square" rtlCol="0" anchor="ctr"/>
@@ -9219,7 +9077,7 @@
           <a:noFill/>
           <a:ln w="38100">
             <a:solidFill>
-              <a:srgbClr val="F39C12"/>
+              <a:srgbClr val="ED561B"/>
             </a:solidFill>
             <a:prstDash val="solid"/>
           </a:ln>
@@ -9255,7 +9113,7 @@
             <a:r>
               <a:rPr lang="en-US" sz="1000" b="1" dirty="0">
                 <a:solidFill>
-                  <a:srgbClr val="9A7D0A"/>
+                  <a:srgbClr val="E65100"/>
                 </a:solidFill>
                 <a:latin typeface="Arial" pitchFamily="34" charset="0"/>
                 <a:ea typeface="Arial" pitchFamily="34" charset="-122"/>
@@ -9297,7 +9155,7 @@
             <a:r>
               <a:rPr lang="en-US" sz="800" dirty="0">
                 <a:solidFill>
-                  <a:srgbClr val="2C3E50"/>
+                  <a:srgbClr val="333333"/>
                 </a:solidFill>
                 <a:latin typeface="Arial" pitchFamily="34" charset="0"/>
                 <a:ea typeface="Arial" pitchFamily="34" charset="-122"/>
@@ -9339,7 +9197,7 @@
             <a:r>
               <a:rPr lang="en-US" sz="800" dirty="0">
                 <a:solidFill>
-                  <a:srgbClr val="2C3E50"/>
+                  <a:srgbClr val="333333"/>
                 </a:solidFill>
                 <a:latin typeface="Arial" pitchFamily="34" charset="0"/>
                 <a:ea typeface="Arial" pitchFamily="34" charset="-122"/>
@@ -9381,7 +9239,7 @@
             <a:r>
               <a:rPr lang="en-US" sz="800" dirty="0">
                 <a:solidFill>
-                  <a:srgbClr val="2C3E50"/>
+                  <a:srgbClr val="333333"/>
                 </a:solidFill>
                 <a:latin typeface="Arial" pitchFamily="34" charset="0"/>
                 <a:ea typeface="Arial" pitchFamily="34" charset="-122"/>
@@ -9423,7 +9281,7 @@
             <a:r>
               <a:rPr lang="en-US" sz="800" dirty="0">
                 <a:solidFill>
-                  <a:srgbClr val="2C3E50"/>
+                  <a:srgbClr val="333333"/>
                 </a:solidFill>
                 <a:latin typeface="Arial" pitchFamily="34" charset="0"/>
                 <a:ea typeface="Arial" pitchFamily="34" charset="-122"/>
@@ -9465,7 +9323,7 @@
             <a:r>
               <a:rPr lang="en-US" sz="800" dirty="0">
                 <a:solidFill>
-                  <a:srgbClr val="7F8C8D"/>
+                  <a:srgbClr val="666666"/>
                 </a:solidFill>
                 <a:latin typeface="Arial" pitchFamily="34" charset="0"/>
                 <a:ea typeface="Arial" pitchFamily="34" charset="-122"/>
@@ -9491,7 +9349,7 @@
     <p:bg>
       <p:bgPr>
         <a:solidFill>
-          <a:srgbClr val="F4F6F6"/>
+          <a:srgbClr val="FFFFFF"/>
         </a:solidFill>
       </p:bgPr>
     </p:bg>
@@ -9524,7 +9382,7 @@
             <a:avLst/>
           </a:prstGeom>
           <a:solidFill>
-            <a:srgbClr val="1C2833"/>
+            <a:srgbClr val="1C4587"/>
           </a:solidFill>
           <a:ln/>
         </p:spPr>
@@ -9608,7 +9466,7 @@
             <a:r>
               <a:rPr lang="en-US" sz="1100" b="1" dirty="0">
                 <a:solidFill>
-                  <a:srgbClr val="1C2833"/>
+                  <a:srgbClr val="1C4587"/>
                 </a:solidFill>
                 <a:latin typeface="Arial" pitchFamily="34" charset="0"/>
                 <a:ea typeface="Arial" pitchFamily="34" charset="-122"/>
@@ -9637,16 +9495,9 @@
             </a:avLst>
           </a:prstGeom>
           <a:solidFill>
-            <a:srgbClr val="FFFFFF"/>
+            <a:srgbClr val="F8F9FA"/>
           </a:solidFill>
           <a:ln/>
-          <a:effectLst>
-            <a:outerShdw sx="100000" sy="100000" kx="0" ky="0" algn="bl" rotWithShape="0" blurRad="38100" dist="13470" dir="2700000">
-              <a:srgbClr val="000000">
-                <a:alpha val="8000"/>
-              </a:srgbClr>
-            </a:outerShdw>
-          </a:effectLst>
         </p:spPr>
         <p:txBody>
           <a:bodyPr wrap="square" rtlCol="0" anchor="ctr"/>
@@ -9676,7 +9527,7 @@
           <a:noFill/>
           <a:ln w="38100">
             <a:solidFill>
-              <a:srgbClr val="3498DB"/>
+              <a:srgbClr val="058DC7"/>
             </a:solidFill>
             <a:prstDash val="solid"/>
           </a:ln>
@@ -9712,7 +9563,7 @@
             <a:r>
               <a:rPr lang="en-US" sz="1000" b="1" dirty="0">
                 <a:solidFill>
-                  <a:srgbClr val="1C2833"/>
+                  <a:srgbClr val="1C4587"/>
                 </a:solidFill>
                 <a:latin typeface="Arial" pitchFamily="34" charset="0"/>
                 <a:ea typeface="Arial" pitchFamily="34" charset="-122"/>
@@ -9751,7 +9602,7 @@
             <a:r>
               <a:rPr lang="en-US" sz="800" dirty="0">
                 <a:solidFill>
-                  <a:srgbClr val="2C3E50"/>
+                  <a:srgbClr val="333333"/>
                 </a:solidFill>
                 <a:latin typeface="Arial" pitchFamily="34" charset="0"/>
                 <a:ea typeface="Arial" pitchFamily="34" charset="-122"/>
@@ -9780,16 +9631,9 @@
             </a:avLst>
           </a:prstGeom>
           <a:solidFill>
-            <a:srgbClr val="FFFFFF"/>
+            <a:srgbClr val="F8F9FA"/>
           </a:solidFill>
           <a:ln/>
-          <a:effectLst>
-            <a:outerShdw sx="100000" sy="100000" kx="0" ky="0" algn="bl" rotWithShape="0" blurRad="38100" dist="13470" dir="2700000">
-              <a:srgbClr val="000000">
-                <a:alpha val="8000"/>
-              </a:srgbClr>
-            </a:outerShdw>
-          </a:effectLst>
         </p:spPr>
         <p:txBody>
           <a:bodyPr wrap="square" rtlCol="0" anchor="ctr"/>
@@ -9819,7 +9663,7 @@
           <a:noFill/>
           <a:ln w="38100">
             <a:solidFill>
-              <a:srgbClr val="3498DB"/>
+              <a:srgbClr val="058DC7"/>
             </a:solidFill>
             <a:prstDash val="solid"/>
           </a:ln>
@@ -9855,7 +9699,7 @@
             <a:r>
               <a:rPr lang="en-US" sz="1000" b="1" dirty="0">
                 <a:solidFill>
-                  <a:srgbClr val="1C2833"/>
+                  <a:srgbClr val="1C4587"/>
                 </a:solidFill>
                 <a:latin typeface="Arial" pitchFamily="34" charset="0"/>
                 <a:ea typeface="Arial" pitchFamily="34" charset="-122"/>
@@ -9894,7 +9738,7 @@
             <a:r>
               <a:rPr lang="en-US" sz="800" dirty="0">
                 <a:solidFill>
-                  <a:srgbClr val="2C3E50"/>
+                  <a:srgbClr val="333333"/>
                 </a:solidFill>
                 <a:latin typeface="Arial" pitchFamily="34" charset="0"/>
                 <a:ea typeface="Arial" pitchFamily="34" charset="-122"/>
@@ -9923,16 +9767,9 @@
             </a:avLst>
           </a:prstGeom>
           <a:solidFill>
-            <a:srgbClr val="FFFFFF"/>
+            <a:srgbClr val="F8F9FA"/>
           </a:solidFill>
           <a:ln/>
-          <a:effectLst>
-            <a:outerShdw sx="100000" sy="100000" kx="0" ky="0" algn="bl" rotWithShape="0" blurRad="38100" dist="13470" dir="2700000">
-              <a:srgbClr val="000000">
-                <a:alpha val="8000"/>
-              </a:srgbClr>
-            </a:outerShdw>
-          </a:effectLst>
         </p:spPr>
         <p:txBody>
           <a:bodyPr wrap="square" rtlCol="0" anchor="ctr"/>
@@ -9962,7 +9799,7 @@
           <a:noFill/>
           <a:ln w="38100">
             <a:solidFill>
-              <a:srgbClr val="3498DB"/>
+              <a:srgbClr val="058DC7"/>
             </a:solidFill>
             <a:prstDash val="solid"/>
           </a:ln>
@@ -9998,7 +9835,7 @@
             <a:r>
               <a:rPr lang="en-US" sz="1000" b="1" dirty="0">
                 <a:solidFill>
-                  <a:srgbClr val="1C2833"/>
+                  <a:srgbClr val="1C4587"/>
                 </a:solidFill>
                 <a:latin typeface="Arial" pitchFamily="34" charset="0"/>
                 <a:ea typeface="Arial" pitchFamily="34" charset="-122"/>
@@ -10037,7 +9874,7 @@
             <a:r>
               <a:rPr lang="en-US" sz="800" dirty="0">
                 <a:solidFill>
-                  <a:srgbClr val="2C3E50"/>
+                  <a:srgbClr val="333333"/>
                 </a:solidFill>
                 <a:latin typeface="Arial" pitchFamily="34" charset="0"/>
                 <a:ea typeface="Arial" pitchFamily="34" charset="-122"/>
@@ -10066,16 +9903,9 @@
             </a:avLst>
           </a:prstGeom>
           <a:solidFill>
-            <a:srgbClr val="FFFFFF"/>
+            <a:srgbClr val="F8F9FA"/>
           </a:solidFill>
           <a:ln/>
-          <a:effectLst>
-            <a:outerShdw sx="100000" sy="100000" kx="0" ky="0" algn="bl" rotWithShape="0" blurRad="38100" dist="13470" dir="2700000">
-              <a:srgbClr val="000000">
-                <a:alpha val="8000"/>
-              </a:srgbClr>
-            </a:outerShdw>
-          </a:effectLst>
         </p:spPr>
         <p:txBody>
           <a:bodyPr wrap="square" rtlCol="0" anchor="ctr"/>
@@ -10105,7 +9935,7 @@
           <a:noFill/>
           <a:ln w="38100">
             <a:solidFill>
-              <a:srgbClr val="3498DB"/>
+              <a:srgbClr val="058DC7"/>
             </a:solidFill>
             <a:prstDash val="solid"/>
           </a:ln>
@@ -10141,7 +9971,7 @@
             <a:r>
               <a:rPr lang="en-US" sz="1000" b="1" dirty="0">
                 <a:solidFill>
-                  <a:srgbClr val="1C2833"/>
+                  <a:srgbClr val="1C4587"/>
                 </a:solidFill>
                 <a:latin typeface="Arial" pitchFamily="34" charset="0"/>
                 <a:ea typeface="Arial" pitchFamily="34" charset="-122"/>
@@ -10180,7 +10010,7 @@
             <a:r>
               <a:rPr lang="en-US" sz="800" dirty="0">
                 <a:solidFill>
-                  <a:srgbClr val="2C3E50"/>
+                  <a:srgbClr val="333333"/>
                 </a:solidFill>
                 <a:latin typeface="Arial" pitchFamily="34" charset="0"/>
                 <a:ea typeface="Arial" pitchFamily="34" charset="-122"/>
@@ -10222,7 +10052,7 @@
             <a:r>
               <a:rPr lang="en-US" sz="1100" b="1" dirty="0">
                 <a:solidFill>
-                  <a:srgbClr val="1C2833"/>
+                  <a:srgbClr val="1C4587"/>
                 </a:solidFill>
                 <a:latin typeface="Arial" pitchFamily="34" charset="0"/>
                 <a:ea typeface="Arial" pitchFamily="34" charset="-122"/>
@@ -10251,7 +10081,7 @@
             </a:avLst>
           </a:prstGeom>
           <a:solidFill>
-            <a:srgbClr val="E8F6F3"/>
+            <a:srgbClr val="E8F5E9"/>
           </a:solidFill>
           <a:ln/>
         </p:spPr>
@@ -10283,7 +10113,7 @@
           <a:noFill/>
           <a:ln w="38100">
             <a:solidFill>
-              <a:srgbClr val="1ABC9C"/>
+              <a:srgbClr val="50B432"/>
             </a:solidFill>
             <a:prstDash val="solid"/>
           </a:ln>
@@ -10319,7 +10149,7 @@
             <a:r>
               <a:rPr lang="en-US" sz="1000" b="1" dirty="0">
                 <a:solidFill>
-                  <a:srgbClr val="148F77"/>
+                  <a:srgbClr val="2E7D32"/>
                 </a:solidFill>
                 <a:latin typeface="Arial" pitchFamily="34" charset="0"/>
                 <a:ea typeface="Arial" pitchFamily="34" charset="-122"/>
@@ -10358,7 +10188,7 @@
             <a:r>
               <a:rPr lang="en-US" sz="800" dirty="0">
                 <a:solidFill>
-                  <a:srgbClr val="0E6655"/>
+                  <a:srgbClr val="1B5E20"/>
                 </a:solidFill>
                 <a:latin typeface="Arial" pitchFamily="34" charset="0"/>
                 <a:ea typeface="Arial" pitchFamily="34" charset="-122"/>
@@ -10387,7 +10217,7 @@
             </a:avLst>
           </a:prstGeom>
           <a:solidFill>
-            <a:srgbClr val="E8F6F3"/>
+            <a:srgbClr val="E8F5E9"/>
           </a:solidFill>
           <a:ln/>
         </p:spPr>
@@ -10419,7 +10249,7 @@
           <a:noFill/>
           <a:ln w="38100">
             <a:solidFill>
-              <a:srgbClr val="1ABC9C"/>
+              <a:srgbClr val="50B432"/>
             </a:solidFill>
             <a:prstDash val="solid"/>
           </a:ln>
@@ -10455,7 +10285,7 @@
             <a:r>
               <a:rPr lang="en-US" sz="1000" b="1" dirty="0">
                 <a:solidFill>
-                  <a:srgbClr val="148F77"/>
+                  <a:srgbClr val="2E7D32"/>
                 </a:solidFill>
                 <a:latin typeface="Arial" pitchFamily="34" charset="0"/>
                 <a:ea typeface="Arial" pitchFamily="34" charset="-122"/>
@@ -10494,7 +10324,7 @@
             <a:r>
               <a:rPr lang="en-US" sz="800" dirty="0">
                 <a:solidFill>
-                  <a:srgbClr val="0E6655"/>
+                  <a:srgbClr val="1B5E20"/>
                 </a:solidFill>
                 <a:latin typeface="Arial" pitchFamily="34" charset="0"/>
                 <a:ea typeface="Arial" pitchFamily="34" charset="-122"/>
@@ -10523,16 +10353,9 @@
             </a:avLst>
           </a:prstGeom>
           <a:solidFill>
-            <a:srgbClr val="FFFFFF"/>
+            <a:srgbClr val="F8F9FA"/>
           </a:solidFill>
           <a:ln/>
-          <a:effectLst>
-            <a:outerShdw sx="100000" sy="100000" kx="0" ky="0" algn="bl" rotWithShape="0" blurRad="38100" dist="13470" dir="2700000">
-              <a:srgbClr val="000000">
-                <a:alpha val="8000"/>
-              </a:srgbClr>
-            </a:outerShdw>
-          </a:effectLst>
         </p:spPr>
         <p:txBody>
           <a:bodyPr wrap="square" rtlCol="0" anchor="ctr"/>
@@ -10575,7 +10398,7 @@
             <a:r>
               <a:rPr lang="en-US" sz="1000" b="1" dirty="0">
                 <a:solidFill>
-                  <a:srgbClr val="1C2833"/>
+                  <a:srgbClr val="1C4587"/>
                 </a:solidFill>
                 <a:latin typeface="Arial" pitchFamily="34" charset="0"/>
                 <a:ea typeface="Arial" pitchFamily="34" charset="-122"/>
@@ -10604,7 +10427,7 @@
           <a:noFill/>
           <a:ln w="9525">
             <a:solidFill>
-              <a:srgbClr val="ECF0F1"/>
+              <a:srgbClr val="E0E0E0"/>
             </a:solidFill>
             <a:prstDash val="solid"/>
           </a:ln>
@@ -10643,7 +10466,7 @@
             <a:r>
               <a:rPr lang="en-US" sz="800" dirty="0">
                 <a:solidFill>
-                  <a:srgbClr val="2C3E50"/>
+                  <a:srgbClr val="333333"/>
                 </a:solidFill>
                 <a:latin typeface="Arial" pitchFamily="34" charset="0"/>
                 <a:ea typeface="Arial" pitchFamily="34" charset="-122"/>
@@ -10688,7 +10511,7 @@
             <a:r>
               <a:rPr lang="en-US" sz="800" dirty="0">
                 <a:solidFill>
-                  <a:srgbClr val="7F8C8D"/>
+                  <a:srgbClr val="666666"/>
                 </a:solidFill>
                 <a:latin typeface="Arial" pitchFamily="34" charset="0"/>
                 <a:ea typeface="Arial" pitchFamily="34" charset="-122"/>
@@ -10717,7 +10540,7 @@
           <a:noFill/>
           <a:ln w="9525">
             <a:solidFill>
-              <a:srgbClr val="ECF0F1"/>
+              <a:srgbClr val="E0E0E0"/>
             </a:solidFill>
             <a:prstDash val="solid"/>
           </a:ln>
@@ -10756,7 +10579,7 @@
             <a:r>
               <a:rPr lang="en-US" sz="800" dirty="0">
                 <a:solidFill>
-                  <a:srgbClr val="2C3E50"/>
+                  <a:srgbClr val="333333"/>
                 </a:solidFill>
                 <a:latin typeface="Arial" pitchFamily="34" charset="0"/>
                 <a:ea typeface="Arial" pitchFamily="34" charset="-122"/>
@@ -10801,7 +10624,7 @@
             <a:r>
               <a:rPr lang="en-US" sz="800" dirty="0">
                 <a:solidFill>
-                  <a:srgbClr val="7F8C8D"/>
+                  <a:srgbClr val="666666"/>
                 </a:solidFill>
                 <a:latin typeface="Arial" pitchFamily="34" charset="0"/>
                 <a:ea typeface="Arial" pitchFamily="34" charset="-122"/>
@@ -10830,7 +10653,7 @@
           <a:noFill/>
           <a:ln w="9525">
             <a:solidFill>
-              <a:srgbClr val="ECF0F1"/>
+              <a:srgbClr val="E0E0E0"/>
             </a:solidFill>
             <a:prstDash val="solid"/>
           </a:ln>
@@ -10869,7 +10692,7 @@
             <a:r>
               <a:rPr lang="en-US" sz="800" dirty="0">
                 <a:solidFill>
-                  <a:srgbClr val="2C3E50"/>
+                  <a:srgbClr val="333333"/>
                 </a:solidFill>
                 <a:latin typeface="Arial" pitchFamily="34" charset="0"/>
                 <a:ea typeface="Arial" pitchFamily="34" charset="-122"/>
@@ -10914,7 +10737,7 @@
             <a:r>
               <a:rPr lang="en-US" sz="800" dirty="0">
                 <a:solidFill>
-                  <a:srgbClr val="7F8C8D"/>
+                  <a:srgbClr val="666666"/>
                 </a:solidFill>
                 <a:latin typeface="Arial" pitchFamily="34" charset="0"/>
                 <a:ea typeface="Arial" pitchFamily="34" charset="-122"/>
@@ -10959,7 +10782,7 @@
             <a:r>
               <a:rPr lang="en-US" sz="800" dirty="0">
                 <a:solidFill>
-                  <a:srgbClr val="2C3E50"/>
+                  <a:srgbClr val="333333"/>
                 </a:solidFill>
                 <a:latin typeface="Arial" pitchFamily="34" charset="0"/>
                 <a:ea typeface="Arial" pitchFamily="34" charset="-122"/>
@@ -11004,7 +10827,7 @@
             <a:r>
               <a:rPr lang="en-US" sz="800" dirty="0">
                 <a:solidFill>
-                  <a:srgbClr val="7F8C8D"/>
+                  <a:srgbClr val="666666"/>
                 </a:solidFill>
                 <a:latin typeface="Arial" pitchFamily="34" charset="0"/>
                 <a:ea typeface="Arial" pitchFamily="34" charset="-122"/>
@@ -11030,7 +10853,7 @@
     <p:bg>
       <p:bgPr>
         <a:solidFill>
-          <a:srgbClr val="F4F6F6"/>
+          <a:srgbClr val="FFFFFF"/>
         </a:solidFill>
       </p:bgPr>
     </p:bg>
@@ -11063,7 +10886,7 @@
             <a:avLst/>
           </a:prstGeom>
           <a:solidFill>
-            <a:srgbClr val="1C2833"/>
+            <a:srgbClr val="1C4587"/>
           </a:solidFill>
           <a:ln/>
         </p:spPr>
@@ -11147,7 +10970,7 @@
             <a:r>
               <a:rPr lang="en-US" sz="1100" b="1" dirty="0">
                 <a:solidFill>
-                  <a:srgbClr val="1C2833"/>
+                  <a:srgbClr val="1C4587"/>
                 </a:solidFill>
                 <a:latin typeface="Arial" pitchFamily="34" charset="0"/>
                 <a:ea typeface="Arial" pitchFamily="34" charset="-122"/>
@@ -11176,16 +10999,9 @@
             </a:avLst>
           </a:prstGeom>
           <a:solidFill>
-            <a:srgbClr val="FFFFFF"/>
+            <a:srgbClr val="F8F9FA"/>
           </a:solidFill>
           <a:ln/>
-          <a:effectLst>
-            <a:outerShdw sx="100000" sy="100000" kx="0" ky="0" algn="bl" rotWithShape="0" blurRad="38100" dist="13470" dir="2700000">
-              <a:srgbClr val="000000">
-                <a:alpha val="8000"/>
-              </a:srgbClr>
-            </a:outerShdw>
-          </a:effectLst>
         </p:spPr>
         <p:txBody>
           <a:bodyPr wrap="square" rtlCol="0" anchor="ctr"/>
@@ -11215,7 +11031,7 @@
             </a:avLst>
           </a:prstGeom>
           <a:solidFill>
-            <a:srgbClr val="1C2833"/>
+            <a:srgbClr val="1C4587"/>
           </a:solidFill>
           <a:ln/>
         </p:spPr>
@@ -11247,7 +11063,7 @@
           <a:noFill/>
           <a:ln w="9525">
             <a:solidFill>
-              <a:srgbClr val="ECF0F1"/>
+              <a:srgbClr val="E0E0E0"/>
             </a:solidFill>
             <a:prstDash val="solid"/>
           </a:ln>
@@ -11450,7 +11266,7 @@
           <a:noFill/>
           <a:ln w="9525">
             <a:solidFill>
-              <a:srgbClr val="ECF0F1"/>
+              <a:srgbClr val="E0E0E0"/>
             </a:solidFill>
             <a:prstDash val="solid"/>
           </a:ln>
@@ -11489,7 +11305,7 @@
             <a:r>
               <a:rPr lang="en-US" sz="900" dirty="0">
                 <a:solidFill>
-                  <a:srgbClr val="2C3E50"/>
+                  <a:srgbClr val="333333"/>
                 </a:solidFill>
                 <a:latin typeface="Arial" pitchFamily="34" charset="0"/>
                 <a:ea typeface="Arial" pitchFamily="34" charset="-122"/>
@@ -11534,7 +11350,7 @@
             <a:r>
               <a:rPr lang="en-US" sz="900" b="1" dirty="0">
                 <a:solidFill>
-                  <a:srgbClr val="1C2833"/>
+                  <a:srgbClr val="1C4587"/>
                 </a:solidFill>
                 <a:latin typeface="Arial" pitchFamily="34" charset="0"/>
                 <a:ea typeface="Arial" pitchFamily="34" charset="-122"/>
@@ -11579,7 +11395,7 @@
             <a:r>
               <a:rPr lang="en-US" sz="900" b="1" dirty="0">
                 <a:solidFill>
-                  <a:srgbClr val="1C2833"/>
+                  <a:srgbClr val="1C4587"/>
                 </a:solidFill>
                 <a:latin typeface="Arial" pitchFamily="34" charset="0"/>
                 <a:ea typeface="Arial" pitchFamily="34" charset="-122"/>
@@ -11624,7 +11440,7 @@
             <a:r>
               <a:rPr lang="en-US" sz="900" b="1" dirty="0">
                 <a:solidFill>
-                  <a:srgbClr val="27AE60"/>
+                  <a:srgbClr val="50B432"/>
                 </a:solidFill>
                 <a:latin typeface="Arial" pitchFamily="34" charset="0"/>
                 <a:ea typeface="Arial" pitchFamily="34" charset="-122"/>
@@ -11653,7 +11469,7 @@
           <a:noFill/>
           <a:ln w="9525">
             <a:solidFill>
-              <a:srgbClr val="ECF0F1"/>
+              <a:srgbClr val="E0E0E0"/>
             </a:solidFill>
             <a:prstDash val="solid"/>
           </a:ln>
@@ -11692,7 +11508,7 @@
             <a:r>
               <a:rPr lang="en-US" sz="900" dirty="0">
                 <a:solidFill>
-                  <a:srgbClr val="2C3E50"/>
+                  <a:srgbClr val="333333"/>
                 </a:solidFill>
                 <a:latin typeface="Arial" pitchFamily="34" charset="0"/>
                 <a:ea typeface="Arial" pitchFamily="34" charset="-122"/>
@@ -11737,7 +11553,7 @@
             <a:r>
               <a:rPr lang="en-US" sz="900" b="1" dirty="0">
                 <a:solidFill>
-                  <a:srgbClr val="1C2833"/>
+                  <a:srgbClr val="1C4587"/>
                 </a:solidFill>
                 <a:latin typeface="Arial" pitchFamily="34" charset="0"/>
                 <a:ea typeface="Arial" pitchFamily="34" charset="-122"/>
@@ -11782,7 +11598,7 @@
             <a:r>
               <a:rPr lang="en-US" sz="900" b="1" dirty="0">
                 <a:solidFill>
-                  <a:srgbClr val="1C2833"/>
+                  <a:srgbClr val="1C4587"/>
                 </a:solidFill>
                 <a:latin typeface="Arial" pitchFamily="34" charset="0"/>
                 <a:ea typeface="Arial" pitchFamily="34" charset="-122"/>
@@ -11827,7 +11643,7 @@
             <a:r>
               <a:rPr lang="en-US" sz="900" b="1" dirty="0">
                 <a:solidFill>
-                  <a:srgbClr val="27AE60"/>
+                  <a:srgbClr val="50B432"/>
                 </a:solidFill>
                 <a:latin typeface="Arial" pitchFamily="34" charset="0"/>
                 <a:ea typeface="Arial" pitchFamily="34" charset="-122"/>
@@ -11854,7 +11670,7 @@
             <a:avLst/>
           </a:prstGeom>
           <a:solidFill>
-            <a:srgbClr val="F8F9FA"/>
+            <a:srgbClr val="F0F0F0"/>
           </a:solidFill>
           <a:ln/>
         </p:spPr>
@@ -11902,7 +11718,7 @@
             <a:r>
               <a:rPr lang="en-US" sz="900" b="1" dirty="0">
                 <a:solidFill>
-                  <a:srgbClr val="2C3E50"/>
+                  <a:srgbClr val="333333"/>
                 </a:solidFill>
                 <a:latin typeface="Arial" pitchFamily="34" charset="0"/>
                 <a:ea typeface="Arial" pitchFamily="34" charset="-122"/>
@@ -11947,7 +11763,7 @@
             <a:r>
               <a:rPr lang="en-US" sz="900" b="1" dirty="0">
                 <a:solidFill>
-                  <a:srgbClr val="1C2833"/>
+                  <a:srgbClr val="1C4587"/>
                 </a:solidFill>
                 <a:latin typeface="Arial" pitchFamily="34" charset="0"/>
                 <a:ea typeface="Arial" pitchFamily="34" charset="-122"/>
@@ -11992,7 +11808,7 @@
             <a:r>
               <a:rPr lang="en-US" sz="900" b="1" dirty="0">
                 <a:solidFill>
-                  <a:srgbClr val="27AE60"/>
+                  <a:srgbClr val="50B432"/>
                 </a:solidFill>
                 <a:latin typeface="Arial" pitchFamily="34" charset="0"/>
                 <a:ea typeface="Arial" pitchFamily="34" charset="-122"/>
@@ -12037,7 +11853,7 @@
             <a:r>
               <a:rPr lang="en-US" sz="900" b="1" dirty="0">
                 <a:solidFill>
-                  <a:srgbClr val="27AE60"/>
+                  <a:srgbClr val="50B432"/>
                 </a:solidFill>
                 <a:latin typeface="Arial" pitchFamily="34" charset="0"/>
                 <a:ea typeface="Arial" pitchFamily="34" charset="-122"/>
@@ -12066,7 +11882,7 @@
             </a:avLst>
           </a:prstGeom>
           <a:solidFill>
-            <a:srgbClr val="EBF5FB"/>
+            <a:srgbClr val="E3F2FD"/>
           </a:solidFill>
           <a:ln/>
         </p:spPr>
@@ -12098,7 +11914,7 @@
           <a:noFill/>
           <a:ln w="38100">
             <a:solidFill>
-              <a:srgbClr val="3498DB"/>
+              <a:srgbClr val="058DC7"/>
             </a:solidFill>
             <a:prstDash val="solid"/>
           </a:ln>
@@ -12134,7 +11950,7 @@
             <a:r>
               <a:rPr lang="en-US" sz="1100" b="1" dirty="0">
                 <a:solidFill>
-                  <a:srgbClr val="1A5276"/>
+                  <a:srgbClr val="1565C0"/>
                 </a:solidFill>
                 <a:latin typeface="Arial" pitchFamily="34" charset="0"/>
                 <a:ea typeface="Arial" pitchFamily="34" charset="-122"/>
@@ -12176,7 +11992,7 @@
             <a:r>
               <a:rPr lang="en-US" sz="900" dirty="0">
                 <a:solidFill>
-                  <a:srgbClr val="2471A3"/>
+                  <a:srgbClr val="1976D2"/>
                 </a:solidFill>
                 <a:latin typeface="Arial" pitchFamily="34" charset="0"/>
                 <a:ea typeface="Arial" pitchFamily="34" charset="-122"/>
@@ -12218,7 +12034,7 @@
             <a:r>
               <a:rPr lang="en-US" sz="900" dirty="0">
                 <a:solidFill>
-                  <a:srgbClr val="2471A3"/>
+                  <a:srgbClr val="1976D2"/>
                 </a:solidFill>
                 <a:latin typeface="Arial" pitchFamily="34" charset="0"/>
                 <a:ea typeface="Arial" pitchFamily="34" charset="-122"/>
@@ -12260,7 +12076,7 @@
             <a:r>
               <a:rPr lang="en-US" sz="900" dirty="0">
                 <a:solidFill>
-                  <a:srgbClr val="2471A3"/>
+                  <a:srgbClr val="1976D2"/>
                 </a:solidFill>
                 <a:latin typeface="Arial" pitchFamily="34" charset="0"/>
                 <a:ea typeface="Arial" pitchFamily="34" charset="-122"/>
@@ -12302,7 +12118,7 @@
             <a:r>
               <a:rPr lang="en-US" sz="1100" b="1" dirty="0">
                 <a:solidFill>
-                  <a:srgbClr val="1C2833"/>
+                  <a:srgbClr val="1C4587"/>
                 </a:solidFill>
                 <a:latin typeface="Arial" pitchFamily="34" charset="0"/>
                 <a:ea typeface="Arial" pitchFamily="34" charset="-122"/>

</xml_diff>